<commit_message>
made updates to the steps
</commit_message>
<xml_diff>
--- a/Convectional Neural Networks Poster.pptx
+++ b/Convectional Neural Networks Poster.pptx
@@ -403,11 +403,11 @@
         </c:dLbls>
         <c:gapWidth val="80"/>
         <c:overlap val="25"/>
-        <c:axId val="-1684773792"/>
-        <c:axId val="-1781934064"/>
+        <c:axId val="2145992176"/>
+        <c:axId val="2144343936"/>
       </c:barChart>
       <c:catAx>
-        <c:axId val="-1684773792"/>
+        <c:axId val="2145992176"/>
         <c:scaling>
           <c:orientation val="minMax"/>
         </c:scaling>
@@ -450,7 +450,7 @@
             <a:endParaRPr lang="en-US"/>
           </a:p>
         </c:txPr>
-        <c:crossAx val="-1781934064"/>
+        <c:crossAx val="2144343936"/>
         <c:crosses val="autoZero"/>
         <c:auto val="1"/>
         <c:lblAlgn val="ctr"/>
@@ -458,7 +458,7 @@
         <c:noMultiLvlLbl val="0"/>
       </c:catAx>
       <c:valAx>
-        <c:axId val="-1781934064"/>
+        <c:axId val="2144343936"/>
         <c:scaling>
           <c:orientation val="minMax"/>
         </c:scaling>
@@ -509,7 +509,7 @@
             <a:endParaRPr lang="en-US"/>
           </a:p>
         </c:txPr>
-        <c:crossAx val="-1684773792"/>
+        <c:crossAx val="2145992176"/>
         <c:crosses val="autoZero"/>
         <c:crossBetween val="between"/>
       </c:valAx>
@@ -14351,11 +14351,7 @@
           <a:p>
             <a:r>
               <a:rPr lang="en-US" sz="3200" b="1" dirty="0" smtClean="0"/>
-              <a:t>Problem</a:t>
-            </a:r>
-            <a:r>
-              <a:rPr lang="en-US" sz="3200" b="1" dirty="0" smtClean="0"/>
-              <a:t>: </a:t>
+              <a:t>Problem: </a:t>
             </a:r>
             <a:r>
               <a:rPr lang="en-US" sz="3200" dirty="0" smtClean="0"/>
@@ -14365,26 +14361,17 @@
           <a:p>
             <a:r>
               <a:rPr lang="en-US" sz="3200" b="1" dirty="0" smtClean="0"/>
-              <a:t>Difficulty</a:t>
-            </a:r>
-            <a:r>
-              <a:rPr lang="en-US" sz="3200" b="1" dirty="0" smtClean="0"/>
-              <a:t>: </a:t>
+              <a:t>Difficulty: </a:t>
             </a:r>
             <a:r>
               <a:rPr lang="en-US" sz="3200" dirty="0" smtClean="0"/>
               <a:t>Current machine learning models are effective at copying and regurgitating inputs, but they are less effective at generating original output from those inputs.</a:t>
             </a:r>
-            <a:endParaRPr lang="en-US" sz="3200" dirty="0" smtClean="0"/>
           </a:p>
           <a:p>
             <a:r>
               <a:rPr lang="en-US" sz="3200" b="1" dirty="0" smtClean="0"/>
-              <a:t>Other approaches</a:t>
-            </a:r>
-            <a:r>
-              <a:rPr lang="en-US" sz="3200" b="1" dirty="0" smtClean="0"/>
-              <a:t>:</a:t>
+              <a:t>Other approaches:</a:t>
             </a:r>
             <a:r>
               <a:rPr lang="en-US" sz="3200" dirty="0" smtClean="0"/>
@@ -14924,12 +14911,8 @@
               </a:spcAft>
             </a:pPr>
             <a:r>
-              <a:rPr lang="en-US" sz="2300" kern="1200" dirty="0" smtClean="0"/>
-              <a:t>Preprocess the </a:t>
-            </a:r>
-            <a:r>
-              <a:rPr lang="en-US" sz="2300" kern="1200" dirty="0" smtClean="0"/>
-              <a:t>data</a:t>
+              <a:rPr lang="en-US" sz="2300" b="1" kern="1200" dirty="0" smtClean="0"/>
+              <a:t>Preprocess the data</a:t>
             </a:r>
           </a:p>
           <a:p>
@@ -14947,7 +14930,7 @@
             <a:endParaRPr lang="en-US" sz="2300" dirty="0"/>
           </a:p>
           <a:p>
-            <a:pPr defTabSz="1022350">
+            <a:pPr marL="342900" indent="-342900" defTabSz="1022350">
               <a:lnSpc>
                 <a:spcPct val="90000"/>
               </a:lnSpc>
@@ -14957,14 +14940,20 @@
               <a:spcAft>
                 <a:spcPct val="35000"/>
               </a:spcAft>
+              <a:buFont typeface="Arial" charset="0"/>
+              <a:buChar char="•"/>
             </a:pPr>
             <a:r>
               <a:rPr lang="en-US" sz="2000" dirty="0"/>
-              <a:t>Prepended the title of the recipe to the beginning of the recipe (within brackets) and tab-separated it from the ingredient list, which is comma separated</a:t>
-            </a:r>
-          </a:p>
-          <a:p>
-            <a:pPr lvl="0" defTabSz="1022350">
+              <a:t>Prepended the title of the recipe to the beginning of the recipe (within brackets) and tab-separated it from the ingredient list, which is comma </a:t>
+            </a:r>
+            <a:r>
+              <a:rPr lang="en-US" sz="2000" dirty="0" smtClean="0"/>
+              <a:t>separated</a:t>
+            </a:r>
+          </a:p>
+          <a:p>
+            <a:pPr marL="342900" indent="-342900" defTabSz="1022350">
               <a:lnSpc>
                 <a:spcPct val="90000"/>
               </a:lnSpc>
@@ -14974,24 +14963,16 @@
               <a:spcAft>
                 <a:spcPct val="35000"/>
               </a:spcAft>
+              <a:buFont typeface="Arial" charset="0"/>
+              <a:buChar char="•"/>
             </a:pPr>
-            <a:endParaRPr lang="en-US" sz="2300" kern="1200" dirty="0" smtClean="0"/>
-          </a:p>
-          <a:p>
-            <a:pPr defTabSz="1022350">
-              <a:lnSpc>
-                <a:spcPct val="90000"/>
-              </a:lnSpc>
-              <a:spcBef>
-                <a:spcPct val="0"/>
-              </a:spcBef>
-              <a:spcAft>
-                <a:spcPct val="35000"/>
-              </a:spcAft>
-            </a:pPr>
+            <a:r>
+              <a:rPr lang="en-US" sz="2000" dirty="0" smtClean="0"/>
+              <a:t>Created </a:t>
+            </a:r>
             <a:r>
               <a:rPr lang="en-US" sz="2000" dirty="0"/>
-              <a:t>Created synthetic data by shuffling the ingredient list for each recipe (while retaining the same title) to try and combat dependencies on ingredient order</a:t>
+              <a:t>synthetic data by shuffling the ingredient list for each recipe (while retaining the same title) to try and combat dependencies on ingredient order</a:t>
             </a:r>
           </a:p>
           <a:p>
@@ -15146,7 +15127,7 @@
         <p:spPr>
           <a:xfrm>
             <a:off x="19726670" y="8818786"/>
-            <a:ext cx="4597082" cy="2666521"/>
+            <a:ext cx="4597082" cy="4547590"/>
           </a:xfrm>
           <a:custGeom>
             <a:avLst/>
@@ -15247,38 +15228,72 @@
           <a:lstStyle/>
           <a:p>
             <a:r>
-              <a:rPr lang="en-US" sz="2400" dirty="0" smtClean="0"/>
-              <a:t>Types of </a:t>
-            </a:r>
-            <a:r>
-              <a:rPr lang="en-US" sz="2400" dirty="0" err="1" smtClean="0"/>
+              <a:rPr lang="en-US" sz="2400" b="1" dirty="0" smtClean="0"/>
+              <a:t>Consider </a:t>
+            </a:r>
+            <a:r>
+              <a:rPr lang="en-US" sz="2400" b="1" dirty="0" err="1" smtClean="0"/>
               <a:t>embeddings</a:t>
             </a:r>
             <a:r>
-              <a:rPr lang="en-US" sz="2400" dirty="0" smtClean="0"/>
+              <a:rPr lang="en-US" sz="2400" b="1" dirty="0" smtClean="0"/>
               <a:t>:</a:t>
             </a:r>
           </a:p>
           <a:p>
-            <a:r>
-              <a:rPr lang="en-US" sz="2400" dirty="0" smtClean="0"/>
-              <a:t>Character</a:t>
-            </a:r>
-            <a:endParaRPr lang="en-US" sz="2400" dirty="0"/>
-          </a:p>
-          <a:p>
-            <a:r>
-              <a:rPr lang="en-US" sz="2400" dirty="0" smtClean="0"/>
-              <a:t>Word</a:t>
-            </a:r>
-            <a:endParaRPr lang="en-US" sz="2400" dirty="0"/>
-          </a:p>
-          <a:p>
-            <a:r>
-              <a:rPr lang="en-US" sz="2400" dirty="0" smtClean="0"/>
-              <a:t>Phrase</a:t>
-            </a:r>
-            <a:endParaRPr lang="en-US" sz="2400" dirty="0"/>
+            <a:endParaRPr lang="en-US" sz="2400" b="1" dirty="0"/>
+          </a:p>
+          <a:p>
+            <a:pPr marL="342900" indent="-342900">
+              <a:buFont typeface="Arial" charset="0"/>
+              <a:buChar char="•"/>
+            </a:pPr>
+            <a:r>
+              <a:rPr lang="en-US" sz="2000" dirty="0" smtClean="0"/>
+              <a:t>Used character, word and phrase level embedding.</a:t>
+            </a:r>
+            <a:br>
+              <a:rPr lang="en-US" sz="2000" dirty="0" smtClean="0"/>
+            </a:br>
+            <a:endParaRPr lang="en-US" sz="2000" dirty="0" smtClean="0"/>
+          </a:p>
+          <a:p>
+            <a:pPr marL="342900" indent="-342900">
+              <a:buFont typeface="Arial" charset="0"/>
+              <a:buChar char="•"/>
+            </a:pPr>
+            <a:r>
+              <a:rPr lang="en-US" sz="2000" dirty="0" smtClean="0"/>
+              <a:t>Used char2vec, word2vec and phrase2vec by encoding each ”sentence” as a sparse vector. </a:t>
+            </a:r>
+            <a:br>
+              <a:rPr lang="en-US" sz="2000" dirty="0" smtClean="0"/>
+            </a:br>
+            <a:endParaRPr lang="en-US" sz="2000" dirty="0" smtClean="0"/>
+          </a:p>
+          <a:p>
+            <a:pPr marL="342900" indent="-342900">
+              <a:buFont typeface="Arial" charset="0"/>
+              <a:buChar char="•"/>
+            </a:pPr>
+            <a:r>
+              <a:rPr lang="en-US" sz="2000" dirty="0" smtClean="0"/>
+              <a:t>For char2vec, used a sentence of length 40 and a moving frame. For word2vec and phrase2vec, used a sentence of length 50. </a:t>
+            </a:r>
+            <a:br>
+              <a:rPr lang="en-US" sz="2000" dirty="0" smtClean="0"/>
+            </a:br>
+            <a:endParaRPr lang="en-US" sz="2000" dirty="0" smtClean="0"/>
+          </a:p>
+          <a:p>
+            <a:pPr marL="342900" indent="-342900">
+              <a:buFont typeface="Arial" charset="0"/>
+              <a:buChar char="•"/>
+            </a:pPr>
+            <a:endParaRPr lang="en-US" sz="2400" dirty="0" smtClean="0"/>
+          </a:p>
+          <a:p>
+            <a:endParaRPr lang="en-US" sz="2400" b="1" dirty="0" smtClean="0"/>
           </a:p>
         </p:txBody>
       </p:sp>
@@ -15417,8 +15432,8 @@
         </p:nvSpPr>
         <p:spPr>
           <a:xfrm>
-            <a:off x="25198785" y="8845189"/>
-            <a:ext cx="4597082" cy="2665598"/>
+            <a:off x="25198785" y="8845188"/>
+            <a:ext cx="4597082" cy="4521187"/>
           </a:xfrm>
           <a:custGeom>
             <a:avLst/>
@@ -15519,20 +15534,55 @@
           <a:lstStyle/>
           <a:p>
             <a:r>
-              <a:rPr lang="en-US" sz="2400" dirty="0" smtClean="0"/>
-              <a:t>Model evaluation / </a:t>
-            </a:r>
-            <a:r>
-              <a:rPr lang="en-US" sz="2400" dirty="0" err="1" smtClean="0"/>
-              <a:t>hyperparameter</a:t>
-            </a:r>
-            <a:r>
-              <a:rPr lang="en-US" sz="2400" dirty="0" smtClean="0"/>
-              <a:t> tuning</a:t>
-            </a:r>
-          </a:p>
-          <a:p>
-            <a:endParaRPr lang="en-US" sz="2400" dirty="0"/>
+              <a:rPr lang="en-US" sz="2400" b="1" dirty="0" smtClean="0"/>
+              <a:t>Model </a:t>
+            </a:r>
+            <a:r>
+              <a:rPr lang="en-US" sz="2400" b="1" dirty="0" smtClean="0"/>
+              <a:t>evaluation:</a:t>
+            </a:r>
+          </a:p>
+          <a:p>
+            <a:endParaRPr lang="en-US" sz="2400" b="1" dirty="0"/>
+          </a:p>
+          <a:p>
+            <a:pPr marL="342900" indent="-342900">
+              <a:buFont typeface="Arial" charset="0"/>
+              <a:buChar char="•"/>
+            </a:pPr>
+            <a:r>
+              <a:rPr lang="en-US" sz="2000" dirty="0" smtClean="0"/>
+              <a:t>Ran the code with each of the </a:t>
+            </a:r>
+            <a:r>
+              <a:rPr lang="en-US" sz="2000" dirty="0" err="1" smtClean="0"/>
+              <a:t>embeddings</a:t>
+            </a:r>
+            <a:r>
+              <a:rPr lang="en-US" sz="2000" dirty="0" smtClean="0"/>
+              <a:t> for 100 epochs</a:t>
+            </a:r>
+            <a:br>
+              <a:rPr lang="en-US" sz="2000" dirty="0" smtClean="0"/>
+            </a:br>
+            <a:endParaRPr lang="en-US" sz="2000" dirty="0" smtClean="0"/>
+          </a:p>
+          <a:p>
+            <a:pPr marL="342900" indent="-342900">
+              <a:buFont typeface="Arial" charset="0"/>
+              <a:buChar char="•"/>
+            </a:pPr>
+            <a:r>
+              <a:rPr lang="en-US" sz="2000" dirty="0" smtClean="0"/>
+              <a:t>Evaluate model success by looking at the novel recipes generated by the model</a:t>
+            </a:r>
+          </a:p>
+          <a:p>
+            <a:pPr marL="342900" indent="-342900">
+              <a:buFont typeface="Arial" charset="0"/>
+              <a:buChar char="•"/>
+            </a:pPr>
+            <a:endParaRPr lang="en-US" sz="2000" dirty="0"/>
           </a:p>
         </p:txBody>
       </p:sp>
@@ -15720,11 +15770,7 @@
           <a:p>
             <a:r>
               <a:rPr lang="en-US" dirty="0" smtClean="0"/>
-              <a:t>Pulled </a:t>
-            </a:r>
-            <a:r>
-              <a:rPr lang="en-US" dirty="0" smtClean="0"/>
-              <a:t>90,000 ingredient lists from </a:t>
+              <a:t>Pulled 90,000 ingredient lists from </a:t>
             </a:r>
             <a:r>
               <a:rPr lang="en-US" dirty="0" err="1" smtClean="0"/>
@@ -15732,29 +15778,13 @@
             </a:r>
             <a:r>
               <a:rPr lang="en-US" dirty="0" smtClean="0"/>
-              <a:t> (a recipe repository) using their API and </a:t>
-            </a:r>
+              <a:t> (a recipe repository) using their API and specified ‘cookie’ as the search parameter</a:t>
+            </a:r>
+          </a:p>
+          <a:p>
             <a:r>
               <a:rPr lang="en-US" dirty="0" smtClean="0"/>
-              <a:t>specified ‘cookie</a:t>
-            </a:r>
-            <a:r>
-              <a:rPr lang="en-US" dirty="0" smtClean="0"/>
-              <a:t>’ as the search </a:t>
-            </a:r>
-            <a:r>
-              <a:rPr lang="en-US" dirty="0" smtClean="0"/>
-              <a:t>parameter</a:t>
-            </a:r>
-          </a:p>
-          <a:p>
-            <a:r>
-              <a:rPr lang="en-US" dirty="0" smtClean="0"/>
-              <a:t>Removed </a:t>
-            </a:r>
-            <a:r>
-              <a:rPr lang="en-US" dirty="0" smtClean="0"/>
-              <a:t>any recipes that didn’t have cookie in the title</a:t>
+              <a:t>Removed any recipes that didn’t have cookie in the title</a:t>
             </a:r>
           </a:p>
           <a:p>
@@ -15766,7 +15796,6 @@
               <a:rPr lang="en-US" dirty="0" smtClean="0"/>
               <a:t>ASCII</a:t>
             </a:r>
-            <a:endParaRPr lang="en-US" dirty="0" smtClean="0"/>
           </a:p>
           <a:p>
             <a:r>
@@ -15779,25 +15808,13 @@
             </a:r>
             <a:r>
               <a:rPr lang="en-US" dirty="0" smtClean="0"/>
-              <a:t>words by looking at the term frequency matrix of the corpus </a:t>
-            </a:r>
+              <a:t>words by looking at the term frequency matrix of the corpus and removing any infrequent (&lt;100) terms</a:t>
+            </a:r>
+          </a:p>
+          <a:p>
             <a:r>
               <a:rPr lang="en-US" dirty="0" smtClean="0"/>
-              <a:t>and removing any infrequent (&lt;100) terms</a:t>
-            </a:r>
-          </a:p>
-          <a:p>
-            <a:r>
-              <a:rPr lang="en-US" dirty="0" smtClean="0"/>
-              <a:t>Inspected </a:t>
-            </a:r>
-            <a:r>
-              <a:rPr lang="en-US" dirty="0" smtClean="0"/>
-              <a:t>the final dictionary and removed any words that were instructions or were unrelated to </a:t>
-            </a:r>
-            <a:r>
-              <a:rPr lang="en-US" dirty="0" smtClean="0"/>
-              <a:t>cookies</a:t>
+              <a:t>Inspected the final dictionary and removed any words that were instructions or were unrelated to cookies</a:t>
             </a:r>
           </a:p>
           <a:p>
@@ -15805,7 +15822,6 @@
               <a:rPr lang="en-US" dirty="0" smtClean="0"/>
               <a:t>Removed any words not in the final dictionary from the corpus</a:t>
             </a:r>
-            <a:endParaRPr lang="en-US" dirty="0" smtClean="0"/>
           </a:p>
           <a:p>
             <a:r>
@@ -16334,8 +16350,8 @@
         </p:nvSpPr>
         <p:spPr>
           <a:xfrm>
-            <a:off x="14254555" y="15198548"/>
-            <a:ext cx="4597082" cy="2613716"/>
+            <a:off x="14254554" y="15198546"/>
+            <a:ext cx="4820251" cy="4089019"/>
           </a:xfrm>
           <a:custGeom>
             <a:avLst/>
@@ -16435,7 +16451,7 @@
           </a:bodyPr>
           <a:lstStyle/>
           <a:p>
-            <a:pPr lvl="0" algn="ctr" defTabSz="1022350">
+            <a:pPr lvl="0" defTabSz="1022350">
               <a:lnSpc>
                 <a:spcPct val="90000"/>
               </a:lnSpc>
@@ -16447,10 +16463,149 @@
               </a:spcAft>
             </a:pPr>
             <a:r>
-              <a:rPr lang="en-US" sz="2300" dirty="0" smtClean="0"/>
-              <a:t>Iteration</a:t>
-            </a:r>
-            <a:endParaRPr lang="en-US" sz="2300" dirty="0"/>
+              <a:rPr lang="en-US" sz="2400" b="1" dirty="0" err="1" smtClean="0"/>
+              <a:t>Hyperparameter</a:t>
+            </a:r>
+            <a:r>
+              <a:rPr lang="en-US" sz="2400" b="1" dirty="0" smtClean="0"/>
+              <a:t> Tuning</a:t>
+            </a:r>
+            <a:br>
+              <a:rPr lang="en-US" sz="2400" b="1" dirty="0" smtClean="0"/>
+            </a:br>
+            <a:endParaRPr lang="en-US" sz="2400" b="1" dirty="0" smtClean="0"/>
+          </a:p>
+          <a:p>
+            <a:pPr marL="342900" lvl="0" indent="-342900" defTabSz="1022350">
+              <a:lnSpc>
+                <a:spcPct val="90000"/>
+              </a:lnSpc>
+              <a:spcBef>
+                <a:spcPct val="0"/>
+              </a:spcBef>
+              <a:spcAft>
+                <a:spcPct val="35000"/>
+              </a:spcAft>
+              <a:buFont typeface="Arial" charset="0"/>
+              <a:buChar char="•"/>
+            </a:pPr>
+            <a:r>
+              <a:rPr lang="en-US" sz="2000" dirty="0" smtClean="0"/>
+              <a:t>Compared GRU and LSTM performance</a:t>
+            </a:r>
+            <a:br>
+              <a:rPr lang="en-US" sz="2000" dirty="0" smtClean="0"/>
+            </a:br>
+            <a:endParaRPr lang="en-US" sz="2000" dirty="0" smtClean="0"/>
+          </a:p>
+          <a:p>
+            <a:pPr marL="342900" lvl="0" indent="-342900" defTabSz="1022350">
+              <a:lnSpc>
+                <a:spcPct val="90000"/>
+              </a:lnSpc>
+              <a:spcBef>
+                <a:spcPct val="0"/>
+              </a:spcBef>
+              <a:spcAft>
+                <a:spcPct val="35000"/>
+              </a:spcAft>
+              <a:buFont typeface="Arial" charset="0"/>
+              <a:buChar char="•"/>
+            </a:pPr>
+            <a:r>
+              <a:rPr lang="en-US" sz="2000" dirty="0" smtClean="0"/>
+              <a:t>Varied number of layers in the model (from 2 to 3)</a:t>
+            </a:r>
+            <a:br>
+              <a:rPr lang="en-US" sz="2000" dirty="0" smtClean="0"/>
+            </a:br>
+            <a:endParaRPr lang="en-US" sz="2000" dirty="0" smtClean="0"/>
+          </a:p>
+          <a:p>
+            <a:pPr marL="342900" lvl="0" indent="-342900" defTabSz="1022350">
+              <a:lnSpc>
+                <a:spcPct val="90000"/>
+              </a:lnSpc>
+              <a:spcBef>
+                <a:spcPct val="0"/>
+              </a:spcBef>
+              <a:spcAft>
+                <a:spcPct val="35000"/>
+              </a:spcAft>
+              <a:buFont typeface="Arial" charset="0"/>
+              <a:buChar char="•"/>
+            </a:pPr>
+            <a:r>
+              <a:rPr lang="en-US" sz="2000" dirty="0" smtClean="0"/>
+              <a:t>Played around with number of hidden neurons in the layers</a:t>
+            </a:r>
+            <a:br>
+              <a:rPr lang="en-US" sz="2000" dirty="0" smtClean="0"/>
+            </a:br>
+            <a:endParaRPr lang="en-US" sz="2000" dirty="0" smtClean="0"/>
+          </a:p>
+          <a:p>
+            <a:pPr marL="342900" lvl="0" indent="-342900" defTabSz="1022350">
+              <a:lnSpc>
+                <a:spcPct val="90000"/>
+              </a:lnSpc>
+              <a:spcBef>
+                <a:spcPct val="0"/>
+              </a:spcBef>
+              <a:spcAft>
+                <a:spcPct val="35000"/>
+              </a:spcAft>
+              <a:buFont typeface="Arial" charset="0"/>
+              <a:buChar char="•"/>
+            </a:pPr>
+            <a:r>
+              <a:rPr lang="en-US" sz="2000" dirty="0" smtClean="0"/>
+              <a:t>Considered bidirectional LSTM for char-RNN model</a:t>
+            </a:r>
+          </a:p>
+          <a:p>
+            <a:pPr marL="342900" lvl="0" indent="-342900" defTabSz="1022350">
+              <a:lnSpc>
+                <a:spcPct val="90000"/>
+              </a:lnSpc>
+              <a:spcBef>
+                <a:spcPct val="0"/>
+              </a:spcBef>
+              <a:spcAft>
+                <a:spcPct val="35000"/>
+              </a:spcAft>
+              <a:buFont typeface="Arial" charset="0"/>
+              <a:buChar char="•"/>
+            </a:pPr>
+            <a:endParaRPr lang="en-US" sz="2000" dirty="0" smtClean="0"/>
+          </a:p>
+          <a:p>
+            <a:pPr lvl="0" defTabSz="1022350">
+              <a:lnSpc>
+                <a:spcPct val="90000"/>
+              </a:lnSpc>
+              <a:spcBef>
+                <a:spcPct val="0"/>
+              </a:spcBef>
+              <a:spcAft>
+                <a:spcPct val="35000"/>
+              </a:spcAft>
+            </a:pPr>
+            <a:endParaRPr lang="en-US" sz="2000" b="1" dirty="0"/>
+          </a:p>
+          <a:p>
+            <a:pPr lvl="0" defTabSz="1022350">
+              <a:lnSpc>
+                <a:spcPct val="90000"/>
+              </a:lnSpc>
+              <a:spcBef>
+                <a:spcPct val="0"/>
+              </a:spcBef>
+              <a:spcAft>
+                <a:spcPct val="35000"/>
+              </a:spcAft>
+            </a:pPr>
+            <a:endParaRPr lang="en-US" sz="2400" b="1" dirty="0"/>
           </a:p>
         </p:txBody>
       </p:sp>
@@ -16463,7 +16618,7 @@
         <p:spPr>
           <a:xfrm>
             <a:off x="19726670" y="15172145"/>
-            <a:ext cx="4597082" cy="2666521"/>
+            <a:ext cx="4597082" cy="4115420"/>
           </a:xfrm>
           <a:custGeom>
             <a:avLst/>
@@ -16563,7 +16718,7 @@
           </a:bodyPr>
           <a:lstStyle/>
           <a:p>
-            <a:pPr lvl="0" algn="ctr" defTabSz="1022350">
+            <a:pPr lvl="0" defTabSz="1022350">
               <a:lnSpc>
                 <a:spcPct val="90000"/>
               </a:lnSpc>
@@ -16575,9 +16730,114 @@
               </a:spcAft>
             </a:pPr>
             <a:r>
-              <a:rPr lang="en-US" sz="2400" dirty="0" smtClean="0"/>
-              <a:t>Generate recipe by seeding model with created title in brackets</a:t>
-            </a:r>
+              <a:rPr lang="en-US" sz="2400" b="1" dirty="0" smtClean="0"/>
+              <a:t>Generate Recipes</a:t>
+            </a:r>
+          </a:p>
+          <a:p>
+            <a:pPr lvl="0" defTabSz="1022350">
+              <a:lnSpc>
+                <a:spcPct val="90000"/>
+              </a:lnSpc>
+              <a:spcBef>
+                <a:spcPct val="0"/>
+              </a:spcBef>
+              <a:spcAft>
+                <a:spcPct val="35000"/>
+              </a:spcAft>
+            </a:pPr>
+            <a:endParaRPr lang="en-US" sz="2400" b="1" dirty="0" smtClean="0"/>
+          </a:p>
+          <a:p>
+            <a:pPr marL="342900" lvl="0" indent="-342900" defTabSz="1022350">
+              <a:lnSpc>
+                <a:spcPct val="90000"/>
+              </a:lnSpc>
+              <a:spcBef>
+                <a:spcPct val="0"/>
+              </a:spcBef>
+              <a:spcAft>
+                <a:spcPct val="35000"/>
+              </a:spcAft>
+              <a:buFont typeface="Arial" charset="0"/>
+              <a:buChar char="•"/>
+            </a:pPr>
+            <a:r>
+              <a:rPr lang="en-US" sz="2000" dirty="0" smtClean="0"/>
+              <a:t>One can input a recipe title or keyword and use it  search the training data for a matching title. </a:t>
+            </a:r>
+          </a:p>
+          <a:p>
+            <a:pPr marL="342900" lvl="0" indent="-342900" defTabSz="1022350">
+              <a:lnSpc>
+                <a:spcPct val="90000"/>
+              </a:lnSpc>
+              <a:spcBef>
+                <a:spcPct val="0"/>
+              </a:spcBef>
+              <a:spcAft>
+                <a:spcPct val="35000"/>
+              </a:spcAft>
+              <a:buFont typeface="Arial" charset="0"/>
+              <a:buChar char="•"/>
+            </a:pPr>
+            <a:endParaRPr lang="en-US" sz="2000" dirty="0"/>
+          </a:p>
+          <a:p>
+            <a:pPr marL="342900" lvl="0" indent="-342900" defTabSz="1022350">
+              <a:lnSpc>
+                <a:spcPct val="90000"/>
+              </a:lnSpc>
+              <a:spcBef>
+                <a:spcPct val="0"/>
+              </a:spcBef>
+              <a:spcAft>
+                <a:spcPct val="35000"/>
+              </a:spcAft>
+              <a:buFont typeface="Arial" charset="0"/>
+              <a:buChar char="•"/>
+            </a:pPr>
+            <a:r>
+              <a:rPr lang="en-US" sz="2000" dirty="0" smtClean="0"/>
+              <a:t>Of all the recipes with the keyword in the title, pick one recipe randomly and use some number of words to seed recipe generation </a:t>
+            </a:r>
+            <a:br>
+              <a:rPr lang="en-US" sz="2000" dirty="0" smtClean="0"/>
+            </a:br>
+            <a:endParaRPr lang="en-US" sz="2000" dirty="0" smtClean="0"/>
+          </a:p>
+          <a:p>
+            <a:pPr marL="342900" lvl="0" indent="-342900" defTabSz="1022350">
+              <a:lnSpc>
+                <a:spcPct val="90000"/>
+              </a:lnSpc>
+              <a:spcBef>
+                <a:spcPct val="0"/>
+              </a:spcBef>
+              <a:spcAft>
+                <a:spcPct val="35000"/>
+              </a:spcAft>
+              <a:buFont typeface="Arial" charset="0"/>
+              <a:buChar char="•"/>
+            </a:pPr>
+            <a:r>
+              <a:rPr lang="en-US" sz="2000" dirty="0" smtClean="0"/>
+              <a:t>Can then compare to actual recipe in training data to see how similar the recipe is</a:t>
+            </a:r>
+          </a:p>
+          <a:p>
+            <a:pPr lvl="0" defTabSz="1022350">
+              <a:lnSpc>
+                <a:spcPct val="90000"/>
+              </a:lnSpc>
+              <a:spcBef>
+                <a:spcPct val="0"/>
+              </a:spcBef>
+              <a:spcAft>
+                <a:spcPct val="35000"/>
+              </a:spcAft>
+            </a:pPr>
+            <a:endParaRPr lang="en-US" sz="2000" b="1" dirty="0" smtClean="0"/>
           </a:p>
         </p:txBody>
       </p:sp>
@@ -16696,22 +16956,36 @@
             <a:endParaRPr lang="en-US" sz="2400" dirty="0"/>
           </a:p>
           <a:p>
-            <a:r>
-              <a:rPr lang="en-US" sz="2400" dirty="0" smtClean="0"/>
-              <a:t>Bake cookies</a:t>
-            </a:r>
-          </a:p>
-          <a:p>
-            <a:r>
-              <a:rPr lang="en-US" sz="2400" dirty="0" smtClean="0"/>
-              <a:t>Eat cookies</a:t>
-            </a:r>
-          </a:p>
-          <a:p>
-            <a:r>
-              <a:rPr lang="en-US" sz="2400" dirty="0" smtClean="0"/>
-              <a:t>Profit</a:t>
-            </a:r>
+            <a:pPr algn="ctr"/>
+            <a:r>
+              <a:rPr lang="en-US" sz="2400" b="1" dirty="0" smtClean="0"/>
+              <a:t>Bake </a:t>
+            </a:r>
+            <a:r>
+              <a:rPr lang="en-US" sz="2400" b="1" dirty="0" smtClean="0"/>
+              <a:t>cookies.</a:t>
+            </a:r>
+            <a:endParaRPr lang="en-US" sz="2400" b="1" dirty="0" smtClean="0"/>
+          </a:p>
+          <a:p>
+            <a:pPr algn="ctr"/>
+            <a:r>
+              <a:rPr lang="en-US" sz="2400" b="1" dirty="0" smtClean="0"/>
+              <a:t>Eat </a:t>
+            </a:r>
+            <a:r>
+              <a:rPr lang="en-US" sz="2400" b="1" dirty="0" smtClean="0"/>
+              <a:t>cookies.</a:t>
+            </a:r>
+            <a:endParaRPr lang="en-US" sz="2400" b="1" dirty="0" smtClean="0"/>
+          </a:p>
+          <a:p>
+            <a:pPr algn="ctr"/>
+            <a:r>
+              <a:rPr lang="en-US" sz="2400" b="1" dirty="0" smtClean="0"/>
+              <a:t>Profit.</a:t>
+            </a:r>
+            <a:endParaRPr lang="en-US" sz="2400" b="1" dirty="0" smtClean="0"/>
           </a:p>
           <a:p>
             <a:endParaRPr lang="en-US" sz="2400" dirty="0"/>
@@ -16732,7 +17006,7 @@
         </p:nvSpPr>
         <p:spPr>
           <a:xfrm>
-            <a:off x="14839406" y="18836640"/>
+            <a:off x="15297694" y="20522419"/>
             <a:ext cx="13428617" cy="2862322"/>
           </a:xfrm>
           <a:prstGeom prst="rect">
@@ -16750,7 +17024,6 @@
               <a:rPr lang="en-US" sz="6000" dirty="0" smtClean="0"/>
               <a:t>Placeholder for diagram of an RNN / LSTM / GRU including the size of each layer, number of layers, size of seed</a:t>
             </a:r>
-            <a:endParaRPr lang="en-US" sz="6000" dirty="0" smtClean="0"/>
           </a:p>
         </p:txBody>
       </p:sp>

</xml_diff>

<commit_message>
made some updates to conclusion and technical approach
</commit_message>
<xml_diff>
--- a/Convectional Neural Networks Poster.pptx
+++ b/Convectional Neural Networks Poster.pptx
@@ -403,11 +403,11 @@
         </c:dLbls>
         <c:gapWidth val="80"/>
         <c:overlap val="25"/>
-        <c:axId val="1639074816"/>
-        <c:axId val="1639297392"/>
+        <c:axId val="-94827120"/>
+        <c:axId val="-94824800"/>
       </c:barChart>
       <c:catAx>
-        <c:axId val="1639074816"/>
+        <c:axId val="-94827120"/>
         <c:scaling>
           <c:orientation val="minMax"/>
         </c:scaling>
@@ -450,7 +450,7 @@
             <a:endParaRPr lang="en-US"/>
           </a:p>
         </c:txPr>
-        <c:crossAx val="1639297392"/>
+        <c:crossAx val="-94824800"/>
         <c:crosses val="autoZero"/>
         <c:auto val="1"/>
         <c:lblAlgn val="ctr"/>
@@ -458,7 +458,7 @@
         <c:noMultiLvlLbl val="0"/>
       </c:catAx>
       <c:valAx>
-        <c:axId val="1639297392"/>
+        <c:axId val="-94824800"/>
         <c:scaling>
           <c:orientation val="minMax"/>
         </c:scaling>
@@ -509,7 +509,7 @@
             <a:endParaRPr lang="en-US"/>
           </a:p>
         </c:txPr>
-        <c:crossAx val="1639074816"/>
+        <c:crossAx val="-94827120"/>
         <c:crosses val="autoZero"/>
         <c:crossBetween val="between"/>
       </c:valAx>
@@ -4865,7 +4865,7 @@
           <a:p>
             <a:fld id="{F1C0B079-A316-4C9B-B165-DF9EA8325D2C}" type="datetimeFigureOut">
               <a:rPr lang="en-US" smtClean="0"/>
-              <a:t>5/26/17</a:t>
+              <a:t>5/27/17</a:t>
             </a:fld>
             <a:endParaRPr lang="en-US"/>
           </a:p>
@@ -5030,7 +5030,7 @@
           <a:p>
             <a:fld id="{38F28AB8-57D1-494F-9851-055AD867E790}" type="datetimeFigureOut">
               <a:rPr lang="en-US" smtClean="0"/>
-              <a:t>5/26/17</a:t>
+              <a:t>5/27/17</a:t>
             </a:fld>
             <a:endParaRPr lang="en-US"/>
           </a:p>
@@ -8578,7 +8578,7 @@
           <a:p>
             <a:fld id="{ECAA57DF-1C19-4726-AB84-014692BAD8F5}" type="datetimeFigureOut">
               <a:rPr lang="en-US" smtClean="0"/>
-              <a:t>5/26/17</a:t>
+              <a:t>5/27/17</a:t>
             </a:fld>
             <a:endParaRPr lang="en-US"/>
           </a:p>
@@ -8917,7 +8917,7 @@
             <a:fld id="{ECAA57DF-1C19-4726-AB84-014692BAD8F5}" type="datetimeFigureOut">
               <a:rPr lang="en-US" smtClean="0"/>
               <a:pPr/>
-              <a:t>5/26/17</a:t>
+              <a:t>5/27/17</a:t>
             </a:fld>
             <a:endParaRPr lang="en-US"/>
           </a:p>
@@ -10154,14 +10154,14 @@
           </a:effectLst>
           <a:extLst>
             <a:ext uri="{909E8E84-426E-40dd-AFC4-6F175D3DCCD1}">
-              <a14:hiddenFill xmlns="" xmlns:a14="http://schemas.microsoft.com/office/drawing/2010/main">
+              <a14:hiddenFill xmlns:a14="http://schemas.microsoft.com/office/drawing/2010/main" xmlns="">
                 <a:solidFill>
                   <a:srgbClr val="FFFFFF"/>
                 </a:solidFill>
               </a14:hiddenFill>
             </a:ext>
             <a:ext uri="{91240B29-F687-4f45-9708-019B960494DF}">
-              <a14:hiddenLine xmlns="" xmlns:a14="http://schemas.microsoft.com/office/drawing/2010/main" w="9525">
+              <a14:hiddenLine xmlns:a14="http://schemas.microsoft.com/office/drawing/2010/main" xmlns="" w="9525">
                 <a:solidFill>
                   <a:srgbClr val="000000"/>
                 </a:solidFill>
@@ -10206,14 +10206,14 @@
           </a:ln>
           <a:extLst>
             <a:ext uri="{909E8E84-426E-40dd-AFC4-6F175D3DCCD1}">
-              <a14:hiddenFill xmlns:a14="http://schemas.microsoft.com/office/drawing/2010/main" xmlns="">
+              <a14:hiddenFill xmlns="" xmlns:a14="http://schemas.microsoft.com/office/drawing/2010/main">
                 <a:solidFill>
                   <a:srgbClr val="FFFFFF"/>
                 </a:solidFill>
               </a14:hiddenFill>
             </a:ext>
             <a:ext uri="{91240B29-F687-4f45-9708-019B960494DF}">
-              <a14:hiddenLine xmlns:a14="http://schemas.microsoft.com/office/drawing/2010/main" xmlns="" w="9525">
+              <a14:hiddenLine xmlns="" xmlns:a14="http://schemas.microsoft.com/office/drawing/2010/main" w="9525">
                 <a:solidFill>
                   <a:srgbClr val="000000"/>
                 </a:solidFill>
@@ -10361,7 +10361,7 @@
             <a:effectLst/>
             <a:extLst>
               <a:ext uri="{AF507438-7753-43e0-B8FC-AC1667EBCBE1}">
-                <a14:hiddenEffects xmlns:a14="http://schemas.microsoft.com/office/drawing/2010/main" xmlns="">
+                <a14:hiddenEffects xmlns="" xmlns:a14="http://schemas.microsoft.com/office/drawing/2010/main">
                   <a:effectLst>
                     <a:outerShdw dist="35921" dir="2700000" algn="ctr" rotWithShape="0">
                       <a:schemeClr val="bg2"/>
@@ -10437,7 +10437,7 @@
             <a:effectLst/>
             <a:extLst>
               <a:ext uri="{AF507438-7753-43e0-B8FC-AC1667EBCBE1}">
-                <a14:hiddenEffects xmlns:a14="http://schemas.microsoft.com/office/drawing/2010/main" xmlns="">
+                <a14:hiddenEffects xmlns="" xmlns:a14="http://schemas.microsoft.com/office/drawing/2010/main">
                   <a:effectLst>
                     <a:outerShdw dist="35921" dir="2700000" algn="ctr" rotWithShape="0">
                       <a:schemeClr val="bg2"/>
@@ -10513,7 +10513,7 @@
             <a:effectLst/>
             <a:extLst>
               <a:ext uri="{AF507438-7753-43e0-B8FC-AC1667EBCBE1}">
-                <a14:hiddenEffects xmlns:a14="http://schemas.microsoft.com/office/drawing/2010/main" xmlns="">
+                <a14:hiddenEffects xmlns="" xmlns:a14="http://schemas.microsoft.com/office/drawing/2010/main">
                   <a:effectLst>
                     <a:outerShdw dist="35921" dir="2700000" algn="ctr" rotWithShape="0">
                       <a:schemeClr val="bg2"/>
@@ -10587,7 +10587,7 @@
             <a:effectLst/>
             <a:extLst>
               <a:ext uri="{AF507438-7753-43e0-B8FC-AC1667EBCBE1}">
-                <a14:hiddenEffects xmlns:a14="http://schemas.microsoft.com/office/drawing/2010/main" xmlns="">
+                <a14:hiddenEffects xmlns="" xmlns:a14="http://schemas.microsoft.com/office/drawing/2010/main">
                   <a:effectLst>
                     <a:outerShdw dist="35921" dir="2700000" algn="ctr" rotWithShape="0">
                       <a:schemeClr val="bg2"/>
@@ -10661,7 +10661,7 @@
             <a:effectLst/>
             <a:extLst>
               <a:ext uri="{AF507438-7753-43e0-B8FC-AC1667EBCBE1}">
-                <a14:hiddenEffects xmlns:a14="http://schemas.microsoft.com/office/drawing/2010/main" xmlns="">
+                <a14:hiddenEffects xmlns="" xmlns:a14="http://schemas.microsoft.com/office/drawing/2010/main">
                   <a:effectLst>
                     <a:outerShdw dist="35921" dir="2700000" algn="ctr" rotWithShape="0">
                       <a:schemeClr val="bg2"/>
@@ -10735,7 +10735,7 @@
             <a:effectLst/>
             <a:extLst>
               <a:ext uri="{AF507438-7753-43e0-B8FC-AC1667EBCBE1}">
-                <a14:hiddenEffects xmlns:a14="http://schemas.microsoft.com/office/drawing/2010/main" xmlns="">
+                <a14:hiddenEffects xmlns="" xmlns:a14="http://schemas.microsoft.com/office/drawing/2010/main">
                   <a:effectLst>
                     <a:outerShdw dist="35921" dir="2700000" algn="ctr" rotWithShape="0">
                       <a:schemeClr val="bg2"/>
@@ -10809,7 +10809,7 @@
             <a:effectLst/>
             <a:extLst>
               <a:ext uri="{AF507438-7753-43e0-B8FC-AC1667EBCBE1}">
-                <a14:hiddenEffects xmlns:a14="http://schemas.microsoft.com/office/drawing/2010/main" xmlns="">
+                <a14:hiddenEffects xmlns="" xmlns:a14="http://schemas.microsoft.com/office/drawing/2010/main">
                   <a:effectLst>
                     <a:outerShdw dist="35921" dir="2700000" algn="ctr" rotWithShape="0">
                       <a:schemeClr val="bg2"/>
@@ -10883,7 +10883,7 @@
             <a:effectLst/>
             <a:extLst>
               <a:ext uri="{AF507438-7753-43e0-B8FC-AC1667EBCBE1}">
-                <a14:hiddenEffects xmlns:a14="http://schemas.microsoft.com/office/drawing/2010/main" xmlns="">
+                <a14:hiddenEffects xmlns="" xmlns:a14="http://schemas.microsoft.com/office/drawing/2010/main">
                   <a:effectLst>
                     <a:outerShdw dist="35921" dir="2700000" algn="ctr" rotWithShape="0">
                       <a:schemeClr val="bg2"/>
@@ -10957,7 +10957,7 @@
             <a:effectLst/>
             <a:extLst>
               <a:ext uri="{AF507438-7753-43e0-B8FC-AC1667EBCBE1}">
-                <a14:hiddenEffects xmlns:a14="http://schemas.microsoft.com/office/drawing/2010/main" xmlns="">
+                <a14:hiddenEffects xmlns="" xmlns:a14="http://schemas.microsoft.com/office/drawing/2010/main">
                   <a:effectLst>
                     <a:outerShdw dist="35921" dir="2700000" algn="ctr" rotWithShape="0">
                       <a:schemeClr val="bg2"/>
@@ -11031,7 +11031,7 @@
             <a:effectLst/>
             <a:extLst>
               <a:ext uri="{AF507438-7753-43e0-B8FC-AC1667EBCBE1}">
-                <a14:hiddenEffects xmlns:a14="http://schemas.microsoft.com/office/drawing/2010/main" xmlns="">
+                <a14:hiddenEffects xmlns="" xmlns:a14="http://schemas.microsoft.com/office/drawing/2010/main">
                   <a:effectLst>
                     <a:outerShdw dist="35921" dir="2700000" algn="ctr" rotWithShape="0">
                       <a:schemeClr val="bg2"/>
@@ -11105,7 +11105,7 @@
             <a:effectLst/>
             <a:extLst>
               <a:ext uri="{AF507438-7753-43e0-B8FC-AC1667EBCBE1}">
-                <a14:hiddenEffects xmlns:a14="http://schemas.microsoft.com/office/drawing/2010/main" xmlns="">
+                <a14:hiddenEffects xmlns="" xmlns:a14="http://schemas.microsoft.com/office/drawing/2010/main">
                   <a:effectLst>
                     <a:outerShdw dist="35921" dir="2700000" algn="ctr" rotWithShape="0">
                       <a:schemeClr val="bg2"/>
@@ -11181,7 +11181,7 @@
             <a:effectLst/>
             <a:extLst>
               <a:ext uri="{AF507438-7753-43e0-B8FC-AC1667EBCBE1}">
-                <a14:hiddenEffects xmlns:a14="http://schemas.microsoft.com/office/drawing/2010/main" xmlns="">
+                <a14:hiddenEffects xmlns="" xmlns:a14="http://schemas.microsoft.com/office/drawing/2010/main">
                   <a:effectLst>
                     <a:outerShdw dist="35921" dir="2700000" algn="ctr" rotWithShape="0">
                       <a:schemeClr val="bg2"/>
@@ -11260,7 +11260,7 @@
             <a:effectLst/>
             <a:extLst>
               <a:ext uri="{AF507438-7753-43e0-B8FC-AC1667EBCBE1}">
-                <a14:hiddenEffects xmlns:a14="http://schemas.microsoft.com/office/drawing/2010/main" xmlns="">
+                <a14:hiddenEffects xmlns="" xmlns:a14="http://schemas.microsoft.com/office/drawing/2010/main">
                   <a:effectLst>
                     <a:outerShdw dist="35921" dir="2700000" algn="ctr" rotWithShape="0">
                       <a:schemeClr val="bg2"/>
@@ -11303,7 +11303,7 @@
             <a:effectLst/>
             <a:extLst>
               <a:ext uri="{AF507438-7753-43e0-B8FC-AC1667EBCBE1}">
-                <a14:hiddenEffects xmlns:a14="http://schemas.microsoft.com/office/drawing/2010/main" xmlns="">
+                <a14:hiddenEffects xmlns="" xmlns:a14="http://schemas.microsoft.com/office/drawing/2010/main">
                   <a:effectLst>
                     <a:outerShdw dist="35921" dir="2700000" algn="ctr" rotWithShape="0">
                       <a:schemeClr val="bg2"/>
@@ -11346,7 +11346,7 @@
             <a:effectLst/>
             <a:extLst>
               <a:ext uri="{AF507438-7753-43e0-B8FC-AC1667EBCBE1}">
-                <a14:hiddenEffects xmlns:a14="http://schemas.microsoft.com/office/drawing/2010/main" xmlns="">
+                <a14:hiddenEffects xmlns="" xmlns:a14="http://schemas.microsoft.com/office/drawing/2010/main">
                   <a:effectLst>
                     <a:outerShdw dist="35921" dir="2700000" algn="ctr" rotWithShape="0">
                       <a:schemeClr val="bg2"/>
@@ -11389,7 +11389,7 @@
             <a:effectLst/>
             <a:extLst>
               <a:ext uri="{AF507438-7753-43e0-B8FC-AC1667EBCBE1}">
-                <a14:hiddenEffects xmlns:a14="http://schemas.microsoft.com/office/drawing/2010/main" xmlns="">
+                <a14:hiddenEffects xmlns="" xmlns:a14="http://schemas.microsoft.com/office/drawing/2010/main">
                   <a:effectLst>
                     <a:outerShdw dist="35921" dir="2700000" algn="ctr" rotWithShape="0">
                       <a:schemeClr val="bg2"/>
@@ -11432,7 +11432,7 @@
             <a:effectLst/>
             <a:extLst>
               <a:ext uri="{AF507438-7753-43e0-B8FC-AC1667EBCBE1}">
-                <a14:hiddenEffects xmlns:a14="http://schemas.microsoft.com/office/drawing/2010/main" xmlns="">
+                <a14:hiddenEffects xmlns="" xmlns:a14="http://schemas.microsoft.com/office/drawing/2010/main">
                   <a:effectLst>
                     <a:outerShdw dist="35921" dir="2700000" algn="ctr" rotWithShape="0">
                       <a:schemeClr val="bg2"/>
@@ -11475,7 +11475,7 @@
             <a:effectLst/>
             <a:extLst>
               <a:ext uri="{AF507438-7753-43e0-B8FC-AC1667EBCBE1}">
-                <a14:hiddenEffects xmlns:a14="http://schemas.microsoft.com/office/drawing/2010/main" xmlns="">
+                <a14:hiddenEffects xmlns="" xmlns:a14="http://schemas.microsoft.com/office/drawing/2010/main">
                   <a:effectLst>
                     <a:outerShdw dist="35921" dir="2700000" algn="ctr" rotWithShape="0">
                       <a:schemeClr val="bg2"/>
@@ -11518,7 +11518,7 @@
             <a:effectLst/>
             <a:extLst>
               <a:ext uri="{AF507438-7753-43e0-B8FC-AC1667EBCBE1}">
-                <a14:hiddenEffects xmlns:a14="http://schemas.microsoft.com/office/drawing/2010/main" xmlns="">
+                <a14:hiddenEffects xmlns="" xmlns:a14="http://schemas.microsoft.com/office/drawing/2010/main">
                   <a:effectLst>
                     <a:outerShdw dist="35921" dir="2700000" algn="ctr" rotWithShape="0">
                       <a:schemeClr val="bg2"/>
@@ -11561,7 +11561,7 @@
             <a:effectLst/>
             <a:extLst>
               <a:ext uri="{AF507438-7753-43e0-B8FC-AC1667EBCBE1}">
-                <a14:hiddenEffects xmlns:a14="http://schemas.microsoft.com/office/drawing/2010/main" xmlns="">
+                <a14:hiddenEffects xmlns="" xmlns:a14="http://schemas.microsoft.com/office/drawing/2010/main">
                   <a:effectLst>
                     <a:outerShdw dist="35921" dir="2700000" algn="ctr" rotWithShape="0">
                       <a:schemeClr val="bg2"/>
@@ -11604,7 +11604,7 @@
             <a:effectLst/>
             <a:extLst>
               <a:ext uri="{AF507438-7753-43e0-B8FC-AC1667EBCBE1}">
-                <a14:hiddenEffects xmlns:a14="http://schemas.microsoft.com/office/drawing/2010/main" xmlns="">
+                <a14:hiddenEffects xmlns="" xmlns:a14="http://schemas.microsoft.com/office/drawing/2010/main">
                   <a:effectLst>
                     <a:outerShdw dist="35921" dir="2700000" algn="ctr" rotWithShape="0">
                       <a:schemeClr val="bg2"/>
@@ -11647,7 +11647,7 @@
             <a:effectLst/>
             <a:extLst>
               <a:ext uri="{AF507438-7753-43e0-B8FC-AC1667EBCBE1}">
-                <a14:hiddenEffects xmlns:a14="http://schemas.microsoft.com/office/drawing/2010/main" xmlns="">
+                <a14:hiddenEffects xmlns="" xmlns:a14="http://schemas.microsoft.com/office/drawing/2010/main">
                   <a:effectLst>
                     <a:outerShdw dist="35921" dir="2700000" algn="ctr" rotWithShape="0">
                       <a:schemeClr val="bg2"/>
@@ -11690,7 +11690,7 @@
             <a:effectLst/>
             <a:extLst>
               <a:ext uri="{AF507438-7753-43e0-B8FC-AC1667EBCBE1}">
-                <a14:hiddenEffects xmlns:a14="http://schemas.microsoft.com/office/drawing/2010/main" xmlns="">
+                <a14:hiddenEffects xmlns="" xmlns:a14="http://schemas.microsoft.com/office/drawing/2010/main">
                   <a:effectLst>
                     <a:outerShdw dist="35921" dir="2700000" algn="ctr" rotWithShape="0">
                       <a:schemeClr val="bg2"/>
@@ -11733,7 +11733,7 @@
             <a:effectLst/>
             <a:extLst>
               <a:ext uri="{AF507438-7753-43e0-B8FC-AC1667EBCBE1}">
-                <a14:hiddenEffects xmlns:a14="http://schemas.microsoft.com/office/drawing/2010/main" xmlns="">
+                <a14:hiddenEffects xmlns="" xmlns:a14="http://schemas.microsoft.com/office/drawing/2010/main">
                   <a:effectLst>
                     <a:outerShdw dist="35921" dir="2700000" algn="ctr" rotWithShape="0">
                       <a:schemeClr val="bg2"/>
@@ -11776,7 +11776,7 @@
             <a:effectLst/>
             <a:extLst>
               <a:ext uri="{AF507438-7753-43e0-B8FC-AC1667EBCBE1}">
-                <a14:hiddenEffects xmlns:a14="http://schemas.microsoft.com/office/drawing/2010/main" xmlns="">
+                <a14:hiddenEffects xmlns="" xmlns:a14="http://schemas.microsoft.com/office/drawing/2010/main">
                   <a:effectLst>
                     <a:outerShdw dist="35921" dir="2700000" algn="ctr" rotWithShape="0">
                       <a:schemeClr val="bg2"/>
@@ -11819,7 +11819,7 @@
             <a:effectLst/>
             <a:extLst>
               <a:ext uri="{AF507438-7753-43e0-B8FC-AC1667EBCBE1}">
-                <a14:hiddenEffects xmlns:a14="http://schemas.microsoft.com/office/drawing/2010/main" xmlns="">
+                <a14:hiddenEffects xmlns="" xmlns:a14="http://schemas.microsoft.com/office/drawing/2010/main">
                   <a:effectLst>
                     <a:outerShdw dist="35921" dir="2700000" algn="ctr" rotWithShape="0">
                       <a:schemeClr val="bg2"/>
@@ -11862,7 +11862,7 @@
             <a:effectLst/>
             <a:extLst>
               <a:ext uri="{AF507438-7753-43e0-B8FC-AC1667EBCBE1}">
-                <a14:hiddenEffects xmlns:a14="http://schemas.microsoft.com/office/drawing/2010/main" xmlns="">
+                <a14:hiddenEffects xmlns="" xmlns:a14="http://schemas.microsoft.com/office/drawing/2010/main">
                   <a:effectLst>
                     <a:outerShdw dist="35921" dir="2700000" algn="ctr" rotWithShape="0">
                       <a:schemeClr val="bg2"/>
@@ -11905,7 +11905,7 @@
             <a:effectLst/>
             <a:extLst>
               <a:ext uri="{AF507438-7753-43e0-B8FC-AC1667EBCBE1}">
-                <a14:hiddenEffects xmlns:a14="http://schemas.microsoft.com/office/drawing/2010/main" xmlns="">
+                <a14:hiddenEffects xmlns="" xmlns:a14="http://schemas.microsoft.com/office/drawing/2010/main">
                   <a:effectLst>
                     <a:outerShdw dist="35921" dir="2700000" algn="ctr" rotWithShape="0">
                       <a:schemeClr val="bg2"/>
@@ -11948,7 +11948,7 @@
             <a:effectLst/>
             <a:extLst>
               <a:ext uri="{AF507438-7753-43e0-B8FC-AC1667EBCBE1}">
-                <a14:hiddenEffects xmlns:a14="http://schemas.microsoft.com/office/drawing/2010/main" xmlns="">
+                <a14:hiddenEffects xmlns="" xmlns:a14="http://schemas.microsoft.com/office/drawing/2010/main">
                   <a:effectLst>
                     <a:outerShdw dist="35921" dir="2700000" algn="ctr" rotWithShape="0">
                       <a:schemeClr val="bg2"/>
@@ -11991,7 +11991,7 @@
             <a:effectLst/>
             <a:extLst>
               <a:ext uri="{AF507438-7753-43e0-B8FC-AC1667EBCBE1}">
-                <a14:hiddenEffects xmlns:a14="http://schemas.microsoft.com/office/drawing/2010/main" xmlns="">
+                <a14:hiddenEffects xmlns="" xmlns:a14="http://schemas.microsoft.com/office/drawing/2010/main">
                   <a:effectLst>
                     <a:outerShdw dist="35921" dir="2700000" algn="ctr" rotWithShape="0">
                       <a:schemeClr val="bg2"/>
@@ -12034,7 +12034,7 @@
             <a:effectLst/>
             <a:extLst>
               <a:ext uri="{AF507438-7753-43e0-B8FC-AC1667EBCBE1}">
-                <a14:hiddenEffects xmlns:a14="http://schemas.microsoft.com/office/drawing/2010/main" xmlns="">
+                <a14:hiddenEffects xmlns="" xmlns:a14="http://schemas.microsoft.com/office/drawing/2010/main">
                   <a:effectLst>
                     <a:outerShdw dist="35921" dir="2700000" algn="ctr" rotWithShape="0">
                       <a:schemeClr val="bg2"/>
@@ -12077,7 +12077,7 @@
             <a:effectLst/>
             <a:extLst>
               <a:ext uri="{AF507438-7753-43e0-B8FC-AC1667EBCBE1}">
-                <a14:hiddenEffects xmlns:a14="http://schemas.microsoft.com/office/drawing/2010/main" xmlns="">
+                <a14:hiddenEffects xmlns="" xmlns:a14="http://schemas.microsoft.com/office/drawing/2010/main">
                   <a:effectLst>
                     <a:outerShdw dist="35921" dir="2700000" algn="ctr" rotWithShape="0">
                       <a:schemeClr val="bg2"/>
@@ -12120,7 +12120,7 @@
             <a:effectLst/>
             <a:extLst>
               <a:ext uri="{AF507438-7753-43e0-B8FC-AC1667EBCBE1}">
-                <a14:hiddenEffects xmlns:a14="http://schemas.microsoft.com/office/drawing/2010/main" xmlns="">
+                <a14:hiddenEffects xmlns="" xmlns:a14="http://schemas.microsoft.com/office/drawing/2010/main">
                   <a:effectLst>
                     <a:outerShdw dist="35921" dir="2700000" algn="ctr" rotWithShape="0">
                       <a:schemeClr val="bg2"/>
@@ -12163,7 +12163,7 @@
             <a:effectLst/>
             <a:extLst>
               <a:ext uri="{AF507438-7753-43e0-B8FC-AC1667EBCBE1}">
-                <a14:hiddenEffects xmlns:a14="http://schemas.microsoft.com/office/drawing/2010/main" xmlns="">
+                <a14:hiddenEffects xmlns="" xmlns:a14="http://schemas.microsoft.com/office/drawing/2010/main">
                   <a:effectLst>
                     <a:outerShdw dist="35921" dir="2700000" algn="ctr" rotWithShape="0">
                       <a:schemeClr val="bg2"/>
@@ -12206,7 +12206,7 @@
             <a:effectLst/>
             <a:extLst>
               <a:ext uri="{AF507438-7753-43e0-B8FC-AC1667EBCBE1}">
-                <a14:hiddenEffects xmlns:a14="http://schemas.microsoft.com/office/drawing/2010/main" xmlns="">
+                <a14:hiddenEffects xmlns="" xmlns:a14="http://schemas.microsoft.com/office/drawing/2010/main">
                   <a:effectLst>
                     <a:outerShdw dist="35921" dir="2700000" algn="ctr" rotWithShape="0">
                       <a:schemeClr val="bg2"/>
@@ -12249,7 +12249,7 @@
             <a:effectLst/>
             <a:extLst>
               <a:ext uri="{AF507438-7753-43e0-B8FC-AC1667EBCBE1}">
-                <a14:hiddenEffects xmlns:a14="http://schemas.microsoft.com/office/drawing/2010/main" xmlns="">
+                <a14:hiddenEffects xmlns="" xmlns:a14="http://schemas.microsoft.com/office/drawing/2010/main">
                   <a:effectLst>
                     <a:outerShdw dist="35921" dir="2700000" algn="ctr" rotWithShape="0">
                       <a:schemeClr val="bg2"/>
@@ -12292,7 +12292,7 @@
             <a:effectLst/>
             <a:extLst>
               <a:ext uri="{AF507438-7753-43e0-B8FC-AC1667EBCBE1}">
-                <a14:hiddenEffects xmlns:a14="http://schemas.microsoft.com/office/drawing/2010/main" xmlns="">
+                <a14:hiddenEffects xmlns="" xmlns:a14="http://schemas.microsoft.com/office/drawing/2010/main">
                   <a:effectLst>
                     <a:outerShdw dist="35921" dir="2700000" algn="ctr" rotWithShape="0">
                       <a:schemeClr val="bg2"/>
@@ -12335,7 +12335,7 @@
             <a:effectLst/>
             <a:extLst>
               <a:ext uri="{AF507438-7753-43e0-B8FC-AC1667EBCBE1}">
-                <a14:hiddenEffects xmlns:a14="http://schemas.microsoft.com/office/drawing/2010/main" xmlns="">
+                <a14:hiddenEffects xmlns="" xmlns:a14="http://schemas.microsoft.com/office/drawing/2010/main">
                   <a:effectLst>
                     <a:outerShdw dist="35921" dir="2700000" algn="ctr" rotWithShape="0">
                       <a:schemeClr val="bg2"/>
@@ -12378,7 +12378,7 @@
             <a:effectLst/>
             <a:extLst>
               <a:ext uri="{AF507438-7753-43e0-B8FC-AC1667EBCBE1}">
-                <a14:hiddenEffects xmlns:a14="http://schemas.microsoft.com/office/drawing/2010/main" xmlns="">
+                <a14:hiddenEffects xmlns="" xmlns:a14="http://schemas.microsoft.com/office/drawing/2010/main">
                   <a:effectLst>
                     <a:outerShdw dist="35921" dir="2700000" algn="ctr" rotWithShape="0">
                       <a:schemeClr val="bg2"/>
@@ -12421,7 +12421,7 @@
             <a:effectLst/>
             <a:extLst>
               <a:ext uri="{AF507438-7753-43e0-B8FC-AC1667EBCBE1}">
-                <a14:hiddenEffects xmlns:a14="http://schemas.microsoft.com/office/drawing/2010/main" xmlns="">
+                <a14:hiddenEffects xmlns="" xmlns:a14="http://schemas.microsoft.com/office/drawing/2010/main">
                   <a:effectLst>
                     <a:outerShdw dist="35921" dir="2700000" algn="ctr" rotWithShape="0">
                       <a:schemeClr val="bg2"/>
@@ -12464,7 +12464,7 @@
             <a:effectLst/>
             <a:extLst>
               <a:ext uri="{AF507438-7753-43e0-B8FC-AC1667EBCBE1}">
-                <a14:hiddenEffects xmlns:a14="http://schemas.microsoft.com/office/drawing/2010/main" xmlns="">
+                <a14:hiddenEffects xmlns="" xmlns:a14="http://schemas.microsoft.com/office/drawing/2010/main">
                   <a:effectLst>
                     <a:outerShdw dist="35921" dir="2700000" algn="ctr" rotWithShape="0">
                       <a:schemeClr val="bg2"/>
@@ -12507,7 +12507,7 @@
             <a:effectLst/>
             <a:extLst>
               <a:ext uri="{AF507438-7753-43e0-B8FC-AC1667EBCBE1}">
-                <a14:hiddenEffects xmlns:a14="http://schemas.microsoft.com/office/drawing/2010/main" xmlns="">
+                <a14:hiddenEffects xmlns="" xmlns:a14="http://schemas.microsoft.com/office/drawing/2010/main">
                   <a:effectLst>
                     <a:outerShdw dist="35921" dir="2700000" algn="ctr" rotWithShape="0">
                       <a:schemeClr val="bg2"/>
@@ -12550,7 +12550,7 @@
             <a:effectLst/>
             <a:extLst>
               <a:ext uri="{AF507438-7753-43e0-B8FC-AC1667EBCBE1}">
-                <a14:hiddenEffects xmlns:a14="http://schemas.microsoft.com/office/drawing/2010/main" xmlns="">
+                <a14:hiddenEffects xmlns="" xmlns:a14="http://schemas.microsoft.com/office/drawing/2010/main">
                   <a:effectLst>
                     <a:outerShdw dist="35921" dir="2700000" algn="ctr" rotWithShape="0">
                       <a:schemeClr val="bg2"/>
@@ -12588,7 +12588,7 @@
             <a:effectLst/>
             <a:extLst>
               <a:ext uri="{AF507438-7753-43e0-B8FC-AC1667EBCBE1}">
-                <a14:hiddenEffects xmlns:a14="http://schemas.microsoft.com/office/drawing/2010/main" xmlns="">
+                <a14:hiddenEffects xmlns="" xmlns:a14="http://schemas.microsoft.com/office/drawing/2010/main">
                   <a:effectLst>
                     <a:outerShdw dist="35921" dir="2700000" algn="ctr" rotWithShape="0">
                       <a:schemeClr val="bg2"/>
@@ -12662,7 +12662,7 @@
             <a:effectLst/>
             <a:extLst>
               <a:ext uri="{AF507438-7753-43e0-B8FC-AC1667EBCBE1}">
-                <a14:hiddenEffects xmlns:a14="http://schemas.microsoft.com/office/drawing/2010/main" xmlns="">
+                <a14:hiddenEffects xmlns="" xmlns:a14="http://schemas.microsoft.com/office/drawing/2010/main">
                   <a:effectLst>
                     <a:outerShdw dist="35921" dir="2700000" algn="ctr" rotWithShape="0">
                       <a:schemeClr val="bg2"/>
@@ -12736,7 +12736,7 @@
             <a:effectLst/>
             <a:extLst>
               <a:ext uri="{AF507438-7753-43e0-B8FC-AC1667EBCBE1}">
-                <a14:hiddenEffects xmlns:a14="http://schemas.microsoft.com/office/drawing/2010/main" xmlns="">
+                <a14:hiddenEffects xmlns="" xmlns:a14="http://schemas.microsoft.com/office/drawing/2010/main">
                   <a:effectLst>
                     <a:outerShdw dist="35921" dir="2700000" algn="ctr" rotWithShape="0">
                       <a:schemeClr val="bg2"/>
@@ -12810,7 +12810,7 @@
             <a:effectLst/>
             <a:extLst>
               <a:ext uri="{AF507438-7753-43e0-B8FC-AC1667EBCBE1}">
-                <a14:hiddenEffects xmlns:a14="http://schemas.microsoft.com/office/drawing/2010/main" xmlns="">
+                <a14:hiddenEffects xmlns="" xmlns:a14="http://schemas.microsoft.com/office/drawing/2010/main">
                   <a:effectLst>
                     <a:outerShdw dist="35921" dir="2700000" algn="ctr" rotWithShape="0">
                       <a:schemeClr val="bg2"/>
@@ -13018,7 +13018,7 @@
             <a:effectLst/>
             <a:extLst>
               <a:ext uri="{AF507438-7753-43e0-B8FC-AC1667EBCBE1}">
-                <a14:hiddenEffects xmlns:a14="http://schemas.microsoft.com/office/drawing/2010/main" xmlns="">
+                <a14:hiddenEffects xmlns="" xmlns:a14="http://schemas.microsoft.com/office/drawing/2010/main">
                   <a:effectLst>
                     <a:outerShdw dist="35921" dir="2700000" algn="ctr" rotWithShape="0">
                       <a:schemeClr val="bg2"/>
@@ -13173,7 +13173,7 @@
             <a:effectLst/>
             <a:extLst>
               <a:ext uri="{AF507438-7753-43e0-B8FC-AC1667EBCBE1}">
-                <a14:hiddenEffects xmlns:a14="http://schemas.microsoft.com/office/drawing/2010/main" xmlns="">
+                <a14:hiddenEffects xmlns="" xmlns:a14="http://schemas.microsoft.com/office/drawing/2010/main">
                   <a:effectLst>
                     <a:outerShdw dist="35921" dir="2700000" algn="ctr" rotWithShape="0">
                       <a:schemeClr val="bg2"/>
@@ -13247,7 +13247,7 @@
             <a:effectLst/>
             <a:extLst>
               <a:ext uri="{AF507438-7753-43e0-B8FC-AC1667EBCBE1}">
-                <a14:hiddenEffects xmlns:a14="http://schemas.microsoft.com/office/drawing/2010/main" xmlns="">
+                <a14:hiddenEffects xmlns="" xmlns:a14="http://schemas.microsoft.com/office/drawing/2010/main">
                   <a:effectLst>
                     <a:outerShdw dist="35921" dir="2700000" algn="ctr" rotWithShape="0">
                       <a:schemeClr val="bg2"/>
@@ -13388,7 +13388,7 @@
             <a:effectLst/>
             <a:extLst>
               <a:ext uri="{AF507438-7753-43e0-B8FC-AC1667EBCBE1}">
-                <a14:hiddenEffects xmlns:a14="http://schemas.microsoft.com/office/drawing/2010/main" xmlns="">
+                <a14:hiddenEffects xmlns="" xmlns:a14="http://schemas.microsoft.com/office/drawing/2010/main">
                   <a:effectLst>
                     <a:outerShdw dist="35921" dir="2700000" algn="ctr" rotWithShape="0">
                       <a:schemeClr val="bg2"/>
@@ -13431,7 +13431,7 @@
             <a:effectLst/>
             <a:extLst>
               <a:ext uri="{AF507438-7753-43e0-B8FC-AC1667EBCBE1}">
-                <a14:hiddenEffects xmlns:a14="http://schemas.microsoft.com/office/drawing/2010/main" xmlns="">
+                <a14:hiddenEffects xmlns="" xmlns:a14="http://schemas.microsoft.com/office/drawing/2010/main">
                   <a:effectLst>
                     <a:outerShdw dist="35921" dir="2700000" algn="ctr" rotWithShape="0">
                       <a:schemeClr val="bg2"/>
@@ -13474,7 +13474,7 @@
             <a:effectLst/>
             <a:extLst>
               <a:ext uri="{AF507438-7753-43e0-B8FC-AC1667EBCBE1}">
-                <a14:hiddenEffects xmlns:a14="http://schemas.microsoft.com/office/drawing/2010/main" xmlns="">
+                <a14:hiddenEffects xmlns="" xmlns:a14="http://schemas.microsoft.com/office/drawing/2010/main">
                   <a:effectLst>
                     <a:outerShdw dist="35921" dir="2700000" algn="ctr" rotWithShape="0">
                       <a:schemeClr val="bg2"/>
@@ -13517,7 +13517,7 @@
             <a:effectLst/>
             <a:extLst>
               <a:ext uri="{AF507438-7753-43e0-B8FC-AC1667EBCBE1}">
-                <a14:hiddenEffects xmlns:a14="http://schemas.microsoft.com/office/drawing/2010/main" xmlns="">
+                <a14:hiddenEffects xmlns="" xmlns:a14="http://schemas.microsoft.com/office/drawing/2010/main">
                   <a:effectLst>
                     <a:outerShdw dist="35921" dir="2700000" algn="ctr" rotWithShape="0">
                       <a:schemeClr val="bg2"/>
@@ -14143,7 +14143,7 @@
         <p:spPr>
           <a:xfrm>
             <a:off x="3842445" y="0"/>
-            <a:ext cx="30153641" cy="3842445"/>
+            <a:ext cx="40048755" cy="3842445"/>
           </a:xfrm>
           <a:prstGeom prst="rect">
             <a:avLst/>
@@ -14515,14 +14515,16 @@
         <p:spPr>
           <a:xfrm>
             <a:off x="30749964" y="21212348"/>
-            <a:ext cx="12801600" cy="4344786"/>
+            <a:ext cx="12801600" cy="6646372"/>
           </a:xfrm>
           <a:solidFill>
             <a:srgbClr val="E8E8E8"/>
           </a:solidFill>
         </p:spPr>
         <p:txBody>
-          <a:bodyPr/>
+          <a:bodyPr>
+            <a:normAutofit/>
+          </a:bodyPr>
           <a:lstStyle/>
           <a:p>
             <a:r>
@@ -14536,6 +14538,17 @@
           </a:p>
           <a:p>
             <a:pPr lvl="1"/>
+            <a:r>
+              <a:rPr lang="en-US" dirty="0" smtClean="0"/>
+              <a:t>Difficult to understandable, legitimate recipes using char2vec</a:t>
+            </a:r>
+          </a:p>
+          <a:p>
+            <a:pPr lvl="1"/>
+            <a:r>
+              <a:rPr lang="en-US" dirty="0" smtClean="0"/>
+              <a:t>Word2vec provides the best balance between legibility and creativity</a:t>
+            </a:r>
             <a:endParaRPr lang="en-US" dirty="0"/>
           </a:p>
           <a:p>
@@ -14552,7 +14565,7 @@
             <a:pPr lvl="1"/>
             <a:r>
               <a:rPr lang="en-US" dirty="0" smtClean="0"/>
-              <a:t>Limited to dictionary based on </a:t>
+              <a:t>Dictionary limited to those words/recipes available via the </a:t>
             </a:r>
             <a:r>
               <a:rPr lang="en-US" dirty="0" err="1" smtClean="0"/>
@@ -14560,15 +14573,41 @@
             </a:r>
             <a:r>
               <a:rPr lang="en-US" dirty="0" smtClean="0"/>
-              <a:t> API pull, so there could be other ingredients not included</a:t>
+              <a:t> API</a:t>
             </a:r>
             <a:endParaRPr lang="en-US" dirty="0"/>
           </a:p>
           <a:p>
             <a:r>
               <a:rPr lang="en-US" dirty="0"/>
-              <a:t>How to improve/future work</a:t>
-            </a:r>
+              <a:t>How to improve/future </a:t>
+            </a:r>
+            <a:r>
+              <a:rPr lang="en-US" dirty="0" smtClean="0"/>
+              <a:t>work</a:t>
+            </a:r>
+          </a:p>
+          <a:p>
+            <a:pPr lvl="1"/>
+            <a:r>
+              <a:rPr lang="en-US" dirty="0" smtClean="0"/>
+              <a:t>Generalize to include other types of food (e.g., muffins, cakes), then use combination of words specific to each type to seed recipe generation</a:t>
+            </a:r>
+          </a:p>
+          <a:p>
+            <a:pPr lvl="1"/>
+            <a:r>
+              <a:rPr lang="en-US" dirty="0" smtClean="0"/>
+              <a:t>Train model to classify recipes based on ingredients</a:t>
+            </a:r>
+          </a:p>
+          <a:p>
+            <a:pPr lvl="1"/>
+            <a:r>
+              <a:rPr lang="en-US" dirty="0" smtClean="0"/>
+              <a:t>Include directions to give full recipes</a:t>
+            </a:r>
+            <a:endParaRPr lang="en-US" dirty="0"/>
           </a:p>
         </p:txBody>
       </p:sp>
@@ -14584,7 +14623,7 @@
         </p:nvSpPr>
         <p:spPr>
           <a:xfrm>
-            <a:off x="30749964" y="25722072"/>
+            <a:off x="30749964" y="28084272"/>
             <a:ext cx="12801600" cy="1219200"/>
           </a:xfrm>
           <a:solidFill>
@@ -14614,8 +14653,8 @@
         </p:nvSpPr>
         <p:spPr>
           <a:xfrm>
-            <a:off x="30749964" y="27166824"/>
-            <a:ext cx="12801600" cy="4462272"/>
+            <a:off x="30749964" y="29529024"/>
+            <a:ext cx="12801600" cy="2500376"/>
           </a:xfrm>
           <a:solidFill>
             <a:srgbClr val="E8E8E8"/>
@@ -14669,14 +14708,14 @@
           </a:ln>
           <a:extLst>
             <a:ext uri="{909E8E84-426E-40dd-AFC4-6F175D3DCCD1}">
-              <a14:hiddenFill xmlns:a14="http://schemas.microsoft.com/office/drawing/2010/main" xmlns="">
+              <a14:hiddenFill xmlns="" xmlns:a14="http://schemas.microsoft.com/office/drawing/2010/main">
                 <a:solidFill>
                   <a:srgbClr val="FFFFFF"/>
                 </a:solidFill>
               </a14:hiddenFill>
             </a:ext>
             <a:ext uri="{91240B29-F687-4f45-9708-019B960494DF}">
-              <a14:hiddenLine xmlns:a14="http://schemas.microsoft.com/office/drawing/2010/main" xmlns="" w="9525">
+              <a14:hiddenLine xmlns="" xmlns:a14="http://schemas.microsoft.com/office/drawing/2010/main" w="9525">
                 <a:solidFill>
                   <a:srgbClr val="000000"/>
                 </a:solidFill>
@@ -14755,8 +14794,8 @@
         </p:blipFill>
         <p:spPr>
           <a:xfrm>
-            <a:off x="32657143" y="0"/>
-            <a:ext cx="11234057" cy="3842445"/>
+            <a:off x="32259181" y="0"/>
+            <a:ext cx="11632020" cy="3842445"/>
           </a:xfrm>
         </p:spPr>
       </p:pic>
@@ -15235,10 +15274,7 @@
               <a:rPr lang="en-US" sz="2400" b="1" dirty="0" err="1" smtClean="0"/>
               <a:t>embeddings</a:t>
             </a:r>
-            <a:r>
-              <a:rPr lang="en-US" sz="2400" b="1" dirty="0" smtClean="0"/>
-              <a:t>:</a:t>
-            </a:r>
+            <a:endParaRPr lang="en-US" sz="2400" b="1" dirty="0" smtClean="0"/>
           </a:p>
           <a:p>
             <a:endParaRPr lang="en-US" sz="2400" b="1" dirty="0"/>
@@ -15535,8 +15571,13 @@
           <a:p>
             <a:r>
               <a:rPr lang="en-US" sz="2400" b="1" dirty="0" smtClean="0"/>
-              <a:t>Model evaluation:</a:t>
-            </a:r>
+              <a:t>Model </a:t>
+            </a:r>
+            <a:r>
+              <a:rPr lang="en-US" sz="2400" b="1" dirty="0" smtClean="0"/>
+              <a:t>evaluation</a:t>
+            </a:r>
+            <a:endParaRPr lang="en-US" sz="2400" b="1" dirty="0" smtClean="0"/>
           </a:p>
           <a:p>
             <a:endParaRPr lang="en-US" sz="2400" b="1" dirty="0"/>
@@ -16533,15 +16574,11 @@
             </a:pPr>
             <a:r>
               <a:rPr lang="en-US" sz="2000" dirty="0" smtClean="0"/>
-              <a:t>Played around with number of hidden neurons in the </a:t>
+              <a:t>Adjusted the number </a:t>
             </a:r>
             <a:r>
               <a:rPr lang="en-US" sz="2000" dirty="0" smtClean="0"/>
-              <a:t>layers(128,256,512)</a:t>
-            </a:r>
-            <a:r>
-              <a:rPr lang="en-US" sz="2000" dirty="0" smtClean="0"/>
-              <a:t/>
+              <a:t>of hidden neurons in the layers(128,256,512)</a:t>
             </a:r>
             <a:br>
               <a:rPr lang="en-US" sz="2000" dirty="0" smtClean="0"/>
@@ -16735,11 +16772,7 @@
             </a:pPr>
             <a:r>
               <a:rPr lang="en-US" sz="2400" b="1" dirty="0" smtClean="0"/>
-              <a:t>Generate </a:t>
-            </a:r>
-            <a:r>
-              <a:rPr lang="en-US" sz="2400" b="1" dirty="0" smtClean="0"/>
-              <a:t>Recipes</a:t>
+              <a:t>Generate Recipes</a:t>
             </a:r>
           </a:p>
           <a:p>
@@ -16772,7 +16805,19 @@
             </a:pPr>
             <a:r>
               <a:rPr lang="en-US" sz="2000" dirty="0" smtClean="0"/>
-              <a:t>One can input a recipe title or keyword and use it  search the training data for a matching title. </a:t>
+              <a:t>Input a </a:t>
+            </a:r>
+            <a:r>
+              <a:rPr lang="en-US" sz="2000" dirty="0" smtClean="0"/>
+              <a:t>recipe title or keyword and use it </a:t>
+            </a:r>
+            <a:r>
+              <a:rPr lang="en-US" sz="2000" dirty="0" smtClean="0"/>
+              <a:t>search </a:t>
+            </a:r>
+            <a:r>
+              <a:rPr lang="en-US" sz="2000" dirty="0" smtClean="0"/>
+              <a:t>the training data for a matching title. </a:t>
             </a:r>
           </a:p>
           <a:p>
@@ -16807,31 +16852,23 @@
             </a:pPr>
             <a:r>
               <a:rPr lang="en-US" sz="2000" dirty="0" smtClean="0"/>
-              <a:t>Of all the recipes with the keyword in the title, pick one recipe randomly and use </a:t>
+              <a:t>Randomly select one recipe from the group of recipes that contain the keyword and </a:t>
             </a:r>
             <a:r>
               <a:rPr lang="en-US" sz="2000" dirty="0" smtClean="0"/>
-              <a:t>words </a:t>
+              <a:t>use </a:t>
+            </a:r>
+            <a:r>
+              <a:rPr lang="en-US" sz="2000" dirty="0" smtClean="0"/>
+              <a:t>those words </a:t>
             </a:r>
             <a:r>
               <a:rPr lang="en-US" sz="2000" dirty="0" smtClean="0"/>
               <a:t>to seed recipe </a:t>
             </a:r>
             <a:r>
-              <a:rPr lang="en-US" sz="2000" dirty="0" err="1"/>
-              <a:t>generatiosome</a:t>
-            </a:r>
-            <a:r>
-              <a:rPr lang="en-US" sz="2000" dirty="0"/>
-              <a:t> number </a:t>
-            </a:r>
-            <a:r>
-              <a:rPr lang="en-US" sz="2000" dirty="0" err="1"/>
-              <a:t>ofn</a:t>
-            </a:r>
-            <a:r>
-              <a:rPr lang="en-US" sz="2000" dirty="0"/>
-              <a:t> </a:t>
+              <a:rPr lang="en-US" sz="2000" dirty="0" smtClean="0"/>
+              <a:t>generation</a:t>
             </a:r>
             <a:r>
               <a:rPr lang="en-US" sz="2000" dirty="0" smtClean="0"/>
@@ -16858,7 +16895,11 @@
             </a:pPr>
             <a:r>
               <a:rPr lang="en-US" sz="2000" dirty="0" smtClean="0"/>
-              <a:t>Can then compare to actual recipe in training data to see how similar the recipe is</a:t>
+              <a:t>Compare </a:t>
+            </a:r>
+            <a:r>
+              <a:rPr lang="en-US" sz="2000" dirty="0" smtClean="0"/>
+              <a:t>to actual recipe in training data to see how similar the recipe is</a:t>
             </a:r>
           </a:p>
           <a:p>
@@ -17009,17 +17050,13 @@
             <a:pPr algn="ctr"/>
             <a:r>
               <a:rPr lang="en-US" sz="2400" b="1" dirty="0" smtClean="0"/>
-              <a:t>Profit.</a:t>
-            </a:r>
-          </a:p>
-          <a:p>
-            <a:endParaRPr lang="en-US" sz="2400" dirty="0"/>
-          </a:p>
-          <a:p>
-            <a:r>
-              <a:rPr lang="en-US" sz="2400" dirty="0" smtClean="0"/>
-              <a:t>Joke recipe???????</a:t>
-            </a:r>
+              <a:t>Profit</a:t>
+            </a:r>
+            <a:r>
+              <a:rPr lang="en-US" sz="2400" b="1" dirty="0" smtClean="0"/>
+              <a:t>.</a:t>
+            </a:r>
+            <a:endParaRPr lang="en-US" sz="2400" b="1" dirty="0" smtClean="0"/>
           </a:p>
         </p:txBody>
       </p:sp>
@@ -17032,7 +17069,7 @@
         <p:spPr>
           <a:xfrm>
             <a:off x="14254554" y="18757186"/>
-            <a:ext cx="15541313" cy="6370975"/>
+            <a:ext cx="15541313" cy="7355860"/>
           </a:xfrm>
           <a:prstGeom prst="rect">
             <a:avLst/>
@@ -17047,8 +17084,9 @@
           <a:p>
             <a:r>
               <a:rPr lang="en-US" sz="3200" b="1" dirty="0" smtClean="0"/>
-              <a:t>Technical Approach</a:t>
-            </a:r>
+              <a:t>Current Approach</a:t>
+            </a:r>
+            <a:endParaRPr lang="en-US" sz="3200" b="1" dirty="0" smtClean="0"/>
           </a:p>
           <a:p>
             <a:pPr marL="457200" indent="-457200">
@@ -17057,7 +17095,23 @@
             </a:pPr>
             <a:r>
               <a:rPr lang="en-US" sz="3200" dirty="0" smtClean="0"/>
-              <a:t>Recurrent Neural Network: connections between units form a direct cycle so that it could exhibit dynamic temporal behavior</a:t>
+              <a:t>Recurrent Neural </a:t>
+            </a:r>
+            <a:r>
+              <a:rPr lang="en-US" sz="3200" dirty="0" smtClean="0"/>
+              <a:t>Network (RNN): </a:t>
+            </a:r>
+            <a:r>
+              <a:rPr lang="en-US" sz="3200" dirty="0" smtClean="0"/>
+              <a:t>connections between units form a direct cycle so that it </a:t>
+            </a:r>
+            <a:r>
+              <a:rPr lang="en-US" sz="3200" dirty="0" smtClean="0"/>
+              <a:t>can exhibit </a:t>
+            </a:r>
+            <a:r>
+              <a:rPr lang="en-US" sz="3200" dirty="0" smtClean="0"/>
+              <a:t>dynamic temporal behavior</a:t>
             </a:r>
           </a:p>
           <a:p>
@@ -17113,10 +17167,7 @@
               <a:buFont typeface="Arial" charset="0"/>
               <a:buChar char="•"/>
             </a:pPr>
-            <a:r>
-              <a:rPr lang="en-US" sz="3200" dirty="0" smtClean="0"/>
-              <a:t>LSTM improves RNN by add memory cells that remember long-term values</a:t>
-            </a:r>
+            <a:endParaRPr lang="en-US" sz="3200" dirty="0" smtClean="0"/>
           </a:p>
           <a:p>
             <a:pPr marL="457200" indent="-457200">
@@ -17125,7 +17176,49 @@
             </a:pPr>
             <a:r>
               <a:rPr lang="en-US" sz="3200" dirty="0" smtClean="0"/>
-              <a:t>GRU’s performance was found to be similar to that of LSTM but it has fewer parameters, as they lack an output gate</a:t>
+              <a:t>Long short-term memory (LSTM) </a:t>
+            </a:r>
+            <a:r>
+              <a:rPr lang="en-US" sz="3200" dirty="0" smtClean="0"/>
+              <a:t>improves </a:t>
+            </a:r>
+            <a:r>
+              <a:rPr lang="en-US" sz="3200" dirty="0" smtClean="0"/>
+              <a:t>upon RNNs using </a:t>
+            </a:r>
+            <a:r>
+              <a:rPr lang="en-US" sz="3200" dirty="0" smtClean="0"/>
+              <a:t>memory cells that remember long-term values</a:t>
+            </a:r>
+          </a:p>
+          <a:p>
+            <a:pPr marL="457200" indent="-457200">
+              <a:buFont typeface="Arial" charset="0"/>
+              <a:buChar char="•"/>
+            </a:pPr>
+            <a:r>
+              <a:rPr lang="en-US" sz="3200" dirty="0" smtClean="0"/>
+              <a:t>Gated recurrent units’ (GRUs) </a:t>
+            </a:r>
+            <a:r>
+              <a:rPr lang="en-US" sz="3200" dirty="0" smtClean="0"/>
+              <a:t>performance </a:t>
+            </a:r>
+            <a:r>
+              <a:rPr lang="en-US" sz="3200" dirty="0" smtClean="0"/>
+              <a:t>is similar to </a:t>
+            </a:r>
+            <a:r>
+              <a:rPr lang="en-US" sz="3200" dirty="0" smtClean="0"/>
+              <a:t>LSTM but </a:t>
+            </a:r>
+            <a:r>
+              <a:rPr lang="en-US" sz="3200" dirty="0" smtClean="0"/>
+              <a:t>the model has fewer </a:t>
+            </a:r>
+            <a:r>
+              <a:rPr lang="en-US" sz="3200" dirty="0" smtClean="0"/>
+              <a:t>parameters, as they lack an output gate</a:t>
             </a:r>
           </a:p>
         </p:txBody>
@@ -17212,7 +17305,7 @@
         </p:blipFill>
         <p:spPr>
           <a:xfrm>
-            <a:off x="23164488" y="25209445"/>
+            <a:off x="23164488" y="26740529"/>
             <a:ext cx="1701800" cy="4216400"/>
           </a:xfrm>
           <a:prstGeom prst="rect">
@@ -17242,7 +17335,7 @@
         </p:blipFill>
         <p:spPr>
           <a:xfrm>
-            <a:off x="25326993" y="25162167"/>
+            <a:off x="25326993" y="26693251"/>
             <a:ext cx="1709628" cy="4235794"/>
           </a:xfrm>
           <a:prstGeom prst="rect">
@@ -17272,7 +17365,7 @@
         </p:blipFill>
         <p:spPr>
           <a:xfrm>
-            <a:off x="27497326" y="25162167"/>
+            <a:off x="27497326" y="26693251"/>
             <a:ext cx="1310681" cy="4577602"/>
           </a:xfrm>
           <a:prstGeom prst="rect">
@@ -17288,7 +17381,7 @@
         </p:nvSpPr>
         <p:spPr>
           <a:xfrm>
-            <a:off x="23505443" y="29562892"/>
+            <a:off x="23505443" y="31093976"/>
             <a:ext cx="5302564" cy="461665"/>
           </a:xfrm>
           <a:prstGeom prst="rect">
@@ -17326,8 +17419,8 @@
         </p:nvSpPr>
         <p:spPr>
           <a:xfrm>
-            <a:off x="14228139" y="25218690"/>
-            <a:ext cx="8936349" cy="1077218"/>
+            <a:off x="14228139" y="26239418"/>
+            <a:ext cx="8936349" cy="3046988"/>
           </a:xfrm>
           <a:prstGeom prst="rect">
             <a:avLst/>
@@ -17342,7 +17435,11 @@
           <a:p>
             <a:r>
               <a:rPr lang="en-US" sz="3200" b="1" dirty="0" smtClean="0"/>
-              <a:t>Alternative Approach</a:t>
+              <a:t>Alternative </a:t>
+            </a:r>
+            <a:r>
+              <a:rPr lang="en-US" sz="3200" b="1" dirty="0" smtClean="0"/>
+              <a:t>Approach</a:t>
             </a:r>
           </a:p>
           <a:p>
@@ -17352,7 +17449,23 @@
             </a:pPr>
             <a:r>
               <a:rPr lang="en-US" sz="3200" dirty="0" smtClean="0"/>
-              <a:t>Bidirectional??</a:t>
+              <a:t>Bidirectional</a:t>
+            </a:r>
+            <a:r>
+              <a:rPr lang="en-US" sz="3200" dirty="0"/>
+              <a:t> </a:t>
+            </a:r>
+            <a:r>
+              <a:rPr lang="en-US" sz="3200" dirty="0" smtClean="0"/>
+              <a:t>RNN: </a:t>
+            </a:r>
+            <a:r>
+              <a:rPr lang="en-US" sz="3200" dirty="0"/>
+              <a:t>connect two hidden layers of opposite directions to the same </a:t>
+            </a:r>
+            <a:r>
+              <a:rPr lang="en-US" sz="3200" dirty="0" smtClean="0"/>
+              <a:t>output, so the output layer can get information from both past (left context) and future (right context) states</a:t>
             </a:r>
             <a:endParaRPr lang="en-US" sz="3200" dirty="0" smtClean="0"/>
           </a:p>

</xml_diff>

<commit_message>
edited references and results
</commit_message>
<xml_diff>
--- a/Convectional Neural Networks Poster.pptx
+++ b/Convectional Neural Networks Poster.pptx
@@ -4982,7 +4982,7 @@
         <p:spPr>
           <a:xfrm>
             <a:off x="457202" y="5669280"/>
-            <a:ext cx="12801600" cy="1280160"/>
+            <a:ext cx="12801600" cy="1219200"/>
           </a:xfrm>
           <a:solidFill>
             <a:srgbClr val="520063"/>
@@ -5227,8 +5227,8 @@
         </p:nvSpPr>
         <p:spPr>
           <a:xfrm>
-            <a:off x="30791620" y="15519401"/>
-            <a:ext cx="12801600" cy="3886200"/>
+            <a:off x="30791620" y="13436820"/>
+            <a:ext cx="12801600" cy="1153899"/>
           </a:xfrm>
         </p:spPr>
         <p:txBody>
@@ -5242,20 +5242,7 @@
             </a:pPr>
             <a:r>
               <a:rPr lang="en-US" dirty="0" smtClean="0"/>
-              <a:t>We see that the model performs fairly well because if the generated output is not a real word, the next most likely characters would form a word.</a:t>
-            </a:r>
-          </a:p>
-          <a:p>
-            <a:pPr>
-              <a:buClrTx/>
-            </a:pPr>
-            <a:r>
-              <a:rPr lang="en-US" dirty="0" smtClean="0">
-                <a:solidFill>
-                  <a:srgbClr val="FF0000"/>
-                </a:solidFill>
-              </a:rPr>
-              <a:t>WILL UPDATE WITH HEATMAPS FOR word-level model (may possibly include phrase-level model</a:t>
+              <a:t>Character level embedding with LSTM</a:t>
             </a:r>
             <a:endParaRPr lang="en-US" dirty="0">
               <a:solidFill>
@@ -5289,10 +5276,9 @@
           <a:lstStyle/>
           <a:p>
             <a:r>
-              <a:rPr lang="en-US"/>
+              <a:rPr lang="en-US" dirty="0"/>
               <a:t>Conclusion</a:t>
             </a:r>
-            <a:endParaRPr lang="en-US" dirty="0"/>
           </a:p>
         </p:txBody>
       </p:sp>
@@ -5485,23 +5471,142 @@
           </a:solidFill>
         </p:spPr>
         <p:txBody>
-          <a:bodyPr/>
+          <a:bodyPr>
+            <a:normAutofit/>
+          </a:bodyPr>
           <a:lstStyle/>
           <a:p>
             <a:pPr>
               <a:buClrTx/>
             </a:pPr>
             <a:r>
-              <a:rPr lang="en-US" dirty="0" err="1" smtClean="0"/>
-              <a:t>Karpathy</a:t>
-            </a:r>
-            <a:endParaRPr lang="en-US" dirty="0" smtClean="0"/>
+              <a:rPr lang="en-US" sz="2000" dirty="0" smtClean="0"/>
+              <a:t>Do Androids Dream of Cooking? (Tom </a:t>
+            </a:r>
+            <a:r>
+              <a:rPr lang="en-US" sz="2000" dirty="0" err="1" smtClean="0"/>
+              <a:t>Brewe</a:t>
+            </a:r>
+            <a:r>
+              <a:rPr lang="en-US" sz="2000" dirty="0" smtClean="0"/>
+              <a:t>)</a:t>
+            </a:r>
           </a:p>
           <a:p>
             <a:pPr>
               <a:buClrTx/>
             </a:pPr>
-            <a:endParaRPr lang="en-US" dirty="0"/>
+            <a:r>
+              <a:rPr lang="en-US" sz="2000" dirty="0" err="1" smtClean="0"/>
+              <a:t>Keras</a:t>
+            </a:r>
+            <a:r>
+              <a:rPr lang="en-US" sz="2000" dirty="0" smtClean="0"/>
+              <a:t> LSTM Text Generation Example Code (Fran</a:t>
+            </a:r>
+            <a:r>
+              <a:rPr lang="tr-TR" sz="2000" dirty="0" err="1" smtClean="0"/>
+              <a:t>çois</a:t>
+            </a:r>
+            <a:r>
+              <a:rPr lang="tr-TR" sz="2000" dirty="0" smtClean="0"/>
+              <a:t> </a:t>
+            </a:r>
+            <a:r>
+              <a:rPr lang="tr-TR" sz="2000" dirty="0" err="1" smtClean="0"/>
+              <a:t>Chollet</a:t>
+            </a:r>
+            <a:r>
+              <a:rPr lang="tr-TR" sz="2000" dirty="0" smtClean="0"/>
+              <a:t>)</a:t>
+            </a:r>
+          </a:p>
+          <a:p>
+            <a:pPr>
+              <a:buClrTx/>
+            </a:pPr>
+            <a:r>
+              <a:rPr lang="tr-TR" sz="2000" dirty="0" smtClean="0"/>
+              <a:t>Word RNN </a:t>
+            </a:r>
+            <a:r>
+              <a:rPr lang="tr-TR" sz="2000" dirty="0" err="1" smtClean="0"/>
+              <a:t>Tensorflow</a:t>
+            </a:r>
+            <a:r>
+              <a:rPr lang="tr-TR" sz="2000" dirty="0" smtClean="0"/>
+              <a:t> </a:t>
+            </a:r>
+            <a:r>
+              <a:rPr lang="tr-TR" sz="2000" dirty="0" err="1" smtClean="0"/>
+              <a:t>Code</a:t>
+            </a:r>
+            <a:r>
+              <a:rPr lang="tr-TR" sz="2000" dirty="0" smtClean="0"/>
+              <a:t> (</a:t>
+            </a:r>
+            <a:r>
+              <a:rPr lang="tr-TR" sz="2000" dirty="0" err="1" smtClean="0"/>
+              <a:t>Sung</a:t>
+            </a:r>
+            <a:r>
+              <a:rPr lang="tr-TR" sz="2000" smtClean="0"/>
+              <a:t> Kim)</a:t>
+            </a:r>
+            <a:endParaRPr lang="en-US" sz="2000" dirty="0" smtClean="0"/>
+          </a:p>
+          <a:p>
+            <a:pPr>
+              <a:buClrTx/>
+            </a:pPr>
+            <a:r>
+              <a:rPr lang="en-US" sz="2000" dirty="0" smtClean="0"/>
+              <a:t>The </a:t>
+            </a:r>
+            <a:r>
+              <a:rPr lang="en-US" sz="2000" dirty="0"/>
+              <a:t>Unreasonable Effectiveness of Recurrent Neural </a:t>
+            </a:r>
+            <a:r>
+              <a:rPr lang="en-US" sz="2000" dirty="0" smtClean="0"/>
+              <a:t>Networks (Andrej </a:t>
+            </a:r>
+            <a:r>
+              <a:rPr lang="en-US" sz="2000" dirty="0" err="1" smtClean="0"/>
+              <a:t>Karpathy</a:t>
+            </a:r>
+            <a:r>
+              <a:rPr lang="en-US" sz="2000" dirty="0" smtClean="0"/>
+              <a:t>)</a:t>
+            </a:r>
+          </a:p>
+          <a:p>
+            <a:pPr>
+              <a:buClrTx/>
+            </a:pPr>
+            <a:r>
+              <a:rPr lang="en-US" sz="2000" dirty="0"/>
+              <a:t>Generating Text with Recurrent Neural </a:t>
+            </a:r>
+            <a:r>
+              <a:rPr lang="en-US" sz="2000" dirty="0" smtClean="0"/>
+              <a:t>Networks (Ilya </a:t>
+            </a:r>
+            <a:r>
+              <a:rPr lang="en-US" sz="2000" dirty="0" err="1" smtClean="0"/>
+              <a:t>Sutskever</a:t>
+            </a:r>
+            <a:r>
+              <a:rPr lang="en-US" sz="2000" dirty="0" smtClean="0"/>
+              <a:t>, James Martens, Geoffrey Hinton</a:t>
+            </a:r>
+            <a:endParaRPr lang="en-US" sz="2000" dirty="0"/>
+          </a:p>
+          <a:p>
+            <a:pPr>
+              <a:buClrTx/>
+            </a:pPr>
+            <a:endParaRPr lang="en-US" sz="2000" dirty="0" smtClean="0"/>
           </a:p>
         </p:txBody>
       </p:sp>
@@ -5538,14 +5643,14 @@
           </a:ln>
           <a:extLst>
             <a:ext uri="{909E8E84-426E-40dd-AFC4-6F175D3DCCD1}">
-              <a14:hiddenFill xmlns="" xmlns:a14="http://schemas.microsoft.com/office/drawing/2010/main">
+              <a14:hiddenFill xmlns:a14="http://schemas.microsoft.com/office/drawing/2010/main" xmlns="">
                 <a:solidFill>
                   <a:srgbClr val="FFFFFF"/>
                 </a:solidFill>
               </a14:hiddenFill>
             </a:ext>
             <a:ext uri="{91240B29-F687-4f45-9708-019B960494DF}">
-              <a14:hiddenLine xmlns="" xmlns:a14="http://schemas.microsoft.com/office/drawing/2010/main" w="9525">
+              <a14:hiddenLine xmlns:a14="http://schemas.microsoft.com/office/drawing/2010/main" xmlns="" w="9525">
                 <a:solidFill>
                   <a:srgbClr val="000000"/>
                 </a:solidFill>
@@ -5555,35 +5660,6 @@
               </a14:hiddenLine>
             </a:ext>
           </a:extLst>
-        </p:spPr>
-      </p:pic>
-      <p:pic>
-        <p:nvPicPr>
-          <p:cNvPr id="7" name="Content Placeholder 6"/>
-          <p:cNvPicPr>
-            <a:picLocks noGrp="1" noChangeAspect="1"/>
-          </p:cNvPicPr>
-          <p:nvPr>
-            <p:ph sz="quarter" idx="32"/>
-          </p:nvPr>
-        </p:nvPicPr>
-        <p:blipFill>
-          <a:blip r:embed="rId3">
-            <a:extLst>
-              <a:ext uri="{28A0092B-C50C-407E-A947-70E740481C1C}">
-                <a14:useLocalDpi xmlns:a14="http://schemas.microsoft.com/office/drawing/2010/main" val="0"/>
-              </a:ext>
-            </a:extLst>
-          </a:blip>
-          <a:stretch>
-            <a:fillRect/>
-          </a:stretch>
-        </p:blipFill>
-        <p:spPr>
-          <a:xfrm>
-            <a:off x="33493164" y="7945297"/>
-            <a:ext cx="7315200" cy="5029200"/>
-          </a:xfrm>
         </p:spPr>
       </p:pic>
       <p:pic>
@@ -5597,7 +5673,7 @@
           </p:nvPr>
         </p:nvPicPr>
         <p:blipFill rotWithShape="1">
-          <a:blip r:embed="rId4">
+          <a:blip r:embed="rId3">
             <a:extLst>
               <a:ext uri="{28A0092B-C50C-407E-A947-70E740481C1C}">
                 <a14:useLocalDpi xmlns:a14="http://schemas.microsoft.com/office/drawing/2010/main" val="0"/>
@@ -5626,7 +5702,7 @@
         </p:nvSpPr>
         <p:spPr>
           <a:xfrm>
-            <a:off x="14254555" y="5728703"/>
+            <a:off x="14228139" y="5669280"/>
             <a:ext cx="15541312" cy="1219200"/>
           </a:xfrm>
           <a:solidFill>
@@ -7923,7 +7999,7 @@
           <p:nvPr/>
         </p:nvPicPr>
         <p:blipFill>
-          <a:blip r:embed="rId5">
+          <a:blip r:embed="rId4">
             <a:extLst>
               <a:ext uri="{28A0092B-C50C-407E-A947-70E740481C1C}">
                 <a14:useLocalDpi xmlns:a14="http://schemas.microsoft.com/office/drawing/2010/main" val="0"/>
@@ -7953,7 +8029,7 @@
           <p:nvPr/>
         </p:nvPicPr>
         <p:blipFill>
-          <a:blip r:embed="rId6">
+          <a:blip r:embed="rId5">
             <a:extLst>
               <a:ext uri="{28A0092B-C50C-407E-A947-70E740481C1C}">
                 <a14:useLocalDpi xmlns:a14="http://schemas.microsoft.com/office/drawing/2010/main" val="0"/>
@@ -7983,7 +8059,7 @@
           <p:nvPr/>
         </p:nvPicPr>
         <p:blipFill>
-          <a:blip r:embed="rId7">
+          <a:blip r:embed="rId6">
             <a:extLst>
               <a:ext uri="{28A0092B-C50C-407E-A947-70E740481C1C}">
                 <a14:useLocalDpi xmlns:a14="http://schemas.microsoft.com/office/drawing/2010/main" val="0"/>
@@ -8013,7 +8089,7 @@
           <p:nvPr/>
         </p:nvPicPr>
         <p:blipFill>
-          <a:blip r:embed="rId8">
+          <a:blip r:embed="rId7">
             <a:extLst>
               <a:ext uri="{28A0092B-C50C-407E-A947-70E740481C1C}">
                 <a14:useLocalDpi xmlns:a14="http://schemas.microsoft.com/office/drawing/2010/main" val="0"/>
@@ -8043,7 +8119,7 @@
           <p:nvPr/>
         </p:nvPicPr>
         <p:blipFill>
-          <a:blip r:embed="rId9">
+          <a:blip r:embed="rId8">
             <a:extLst>
               <a:ext uri="{28A0092B-C50C-407E-A947-70E740481C1C}">
                 <a14:useLocalDpi xmlns:a14="http://schemas.microsoft.com/office/drawing/2010/main" val="0"/>
@@ -8170,11 +8246,7 @@
             </a:r>
             <a:r>
               <a:rPr lang="en-US" sz="3200" dirty="0" smtClean="0"/>
-              <a:t>Convolutional </a:t>
-            </a:r>
-            <a:r>
-              <a:rPr lang="en-US" sz="3200" dirty="0" smtClean="0"/>
-              <a:t>NN: </a:t>
+              <a:t>Convolutional NN: </a:t>
             </a:r>
             <a:r>
               <a:rPr lang="en-US" altLang="zh-CN" sz="3200" dirty="0" smtClean="0"/>
@@ -8345,66 +8417,6 @@
               <a:t> </a:t>
             </a:r>
             <a:endParaRPr lang="en-US" sz="3200" dirty="0" smtClean="0"/>
-          </a:p>
-        </p:txBody>
-      </p:sp>
-      <p:sp>
-        <p:nvSpPr>
-          <p:cNvPr id="41" name="Content Placeholder 5"/>
-          <p:cNvSpPr>
-            <a:spLocks noGrp="1"/>
-          </p:cNvSpPr>
-          <p:nvPr>
-            <p:ph sz="quarter" idx="33"/>
-          </p:nvPr>
-        </p:nvSpPr>
-        <p:spPr>
-          <a:xfrm>
-            <a:off x="30791620" y="13023096"/>
-            <a:ext cx="12801600" cy="1999595"/>
-          </a:xfrm>
-        </p:spPr>
-        <p:txBody>
-          <a:bodyPr>
-            <a:noAutofit/>
-          </a:bodyPr>
-          <a:lstStyle/>
-          <a:p>
-            <a:pPr marL="0" lvl="0" indent="0" defTabSz="914400">
-              <a:spcBef>
-                <a:spcPts val="0"/>
-              </a:spcBef>
-              <a:buClrTx/>
-              <a:buNone/>
-            </a:pPr>
-            <a:r>
-              <a:rPr lang="en-US" sz="2400" dirty="0"/>
-              <a:t>spoon baking soda,1 cup flaked coconut,2 teaspoons butter softened,1 teaspoon vanilla extract,1/2 cup softened butter,1/2 cup sugar,3/4 cup brown sugar packed,1 teaspoon vanilla extract,1/2 teaspoon ground nutmeg,3 large eggs,1/2 teaspoon grated filling,1 cup shortening,2 1/4 cups all purpose flour,1 teaspoon vanilla extract,1/2 teaspoon salt,1/4 teaspoon kosher salt,1 cup butter room temperature,1 1/2 tsp. ground cinnamon,2 cups </a:t>
-            </a:r>
-            <a:r>
-              <a:rPr lang="en-US" sz="2400" dirty="0" smtClean="0"/>
-              <a:t>white</a:t>
-            </a:r>
-          </a:p>
-          <a:p>
-            <a:pPr marL="0" lvl="0" indent="0" defTabSz="914400">
-              <a:spcBef>
-                <a:spcPts val="0"/>
-              </a:spcBef>
-              <a:buClrTx/>
-              <a:buNone/>
-            </a:pPr>
-            <a:endParaRPr lang="en-US" sz="2400" dirty="0"/>
-          </a:p>
-          <a:p>
-            <a:pPr marL="0" lvl="0" indent="0" defTabSz="914400">
-              <a:spcBef>
-                <a:spcPts val="0"/>
-              </a:spcBef>
-              <a:buClrTx/>
-              <a:buNone/>
-            </a:pPr>
-            <a:endParaRPr lang="en-US" sz="2800" dirty="0"/>
           </a:p>
         </p:txBody>
       </p:sp>
@@ -8420,8 +8432,8 @@
         </p:nvSpPr>
         <p:spPr>
           <a:xfrm>
-            <a:off x="30791620" y="7171688"/>
-            <a:ext cx="12801600" cy="5738632"/>
+            <a:off x="30776379" y="7613490"/>
+            <a:ext cx="12801600" cy="1255220"/>
           </a:xfrm>
         </p:spPr>
         <p:txBody>
@@ -8435,13 +8447,8 @@
             </a:pPr>
             <a:r>
               <a:rPr lang="en-US" dirty="0" smtClean="0"/>
-              <a:t>Ran the character level CNN and got the following output with the associated heat map. </a:t>
-            </a:r>
-          </a:p>
-          <a:p>
-            <a:pPr>
-              <a:buClrTx/>
-            </a:pPr>
+              <a:t>Character level embedding with CNN </a:t>
+            </a:r>
             <a:endParaRPr lang="en-US" dirty="0"/>
           </a:p>
         </p:txBody>
@@ -8567,6 +8574,357 @@
               <a:rPr lang="en-US" sz="2400" dirty="0"/>
               <a:t>2 cups flour,1 teaspoon baking powder,1 teaspoon baking soda,1 teaspoon salt,3/4 cup butter room temperature,3/4 cup brown sugar ,3/4 cup granulated sugar,2 large eggs,2 teaspoons vanilla ,3 1/2 cups old-fashioned oatmeal,2 cups raisins</a:t>
             </a:r>
+          </a:p>
+        </p:txBody>
+      </p:sp>
+      <p:pic>
+        <p:nvPicPr>
+          <p:cNvPr id="8" name="Content Placeholder 7"/>
+          <p:cNvPicPr>
+            <a:picLocks noGrp="1" noChangeAspect="1"/>
+          </p:cNvPicPr>
+          <p:nvPr>
+            <p:ph sz="quarter" idx="32"/>
+          </p:nvPr>
+        </p:nvPicPr>
+        <p:blipFill>
+          <a:blip r:embed="rId9">
+            <a:extLst>
+              <a:ext uri="{28A0092B-C50C-407E-A947-70E740481C1C}">
+                <a14:useLocalDpi xmlns:a14="http://schemas.microsoft.com/office/drawing/2010/main" val="0"/>
+              </a:ext>
+            </a:extLst>
+          </a:blip>
+          <a:stretch>
+            <a:fillRect/>
+          </a:stretch>
+        </p:blipFill>
+        <p:spPr>
+          <a:xfrm>
+            <a:off x="31382567" y="8469313"/>
+            <a:ext cx="6024417" cy="4141787"/>
+          </a:xfrm>
+        </p:spPr>
+      </p:pic>
+      <p:pic>
+        <p:nvPicPr>
+          <p:cNvPr id="14" name="Content Placeholder 13"/>
+          <p:cNvPicPr>
+            <a:picLocks noGrp="1" noChangeAspect="1"/>
+          </p:cNvPicPr>
+          <p:nvPr>
+            <p:ph sz="quarter" idx="32"/>
+          </p:nvPr>
+        </p:nvPicPr>
+        <p:blipFill>
+          <a:blip r:embed="rId10">
+            <a:extLst>
+              <a:ext uri="{28A0092B-C50C-407E-A947-70E740481C1C}">
+                <a14:useLocalDpi xmlns:a14="http://schemas.microsoft.com/office/drawing/2010/main" val="0"/>
+              </a:ext>
+            </a:extLst>
+          </a:blip>
+          <a:stretch>
+            <a:fillRect/>
+          </a:stretch>
+        </p:blipFill>
+        <p:spPr>
+          <a:xfrm>
+            <a:off x="37406984" y="8492331"/>
+            <a:ext cx="6026727" cy="4143375"/>
+          </a:xfrm>
+        </p:spPr>
+      </p:pic>
+      <p:pic>
+        <p:nvPicPr>
+          <p:cNvPr id="51" name="Content Placeholder 7"/>
+          <p:cNvPicPr>
+            <a:picLocks noGrp="1" noChangeAspect="1"/>
+          </p:cNvPicPr>
+          <p:nvPr>
+            <p:ph sz="quarter" idx="32"/>
+          </p:nvPr>
+        </p:nvPicPr>
+        <p:blipFill>
+          <a:blip r:embed="rId11">
+            <a:extLst>
+              <a:ext uri="{28A0092B-C50C-407E-A947-70E740481C1C}">
+                <a14:useLocalDpi xmlns:a14="http://schemas.microsoft.com/office/drawing/2010/main" val="0"/>
+              </a:ext>
+            </a:extLst>
+          </a:blip>
+          <a:stretch>
+            <a:fillRect/>
+          </a:stretch>
+        </p:blipFill>
+        <p:spPr>
+          <a:xfrm>
+            <a:off x="31382567" y="14172270"/>
+            <a:ext cx="6024417" cy="4141786"/>
+          </a:xfrm>
+        </p:spPr>
+      </p:pic>
+      <p:sp>
+        <p:nvSpPr>
+          <p:cNvPr id="52" name="Content Placeholder 5"/>
+          <p:cNvSpPr>
+            <a:spLocks noGrp="1"/>
+          </p:cNvSpPr>
+          <p:nvPr>
+            <p:ph sz="quarter" idx="33"/>
+          </p:nvPr>
+        </p:nvSpPr>
+        <p:spPr>
+          <a:xfrm>
+            <a:off x="30791620" y="6917029"/>
+            <a:ext cx="12801600" cy="749582"/>
+          </a:xfrm>
+        </p:spPr>
+        <p:txBody>
+          <a:bodyPr>
+            <a:normAutofit fontScale="85000" lnSpcReduction="10000"/>
+          </a:bodyPr>
+          <a:lstStyle/>
+          <a:p>
+            <a:pPr marL="0" marR="0" lvl="0" indent="0" defTabSz="914400" eaLnBrk="1" fontAlgn="auto" latinLnBrk="0" hangingPunct="1">
+              <a:lnSpc>
+                <a:spcPct val="100000"/>
+              </a:lnSpc>
+              <a:spcBef>
+                <a:spcPts val="0"/>
+              </a:spcBef>
+              <a:spcAft>
+                <a:spcPts val="0"/>
+              </a:spcAft>
+              <a:buClrTx/>
+              <a:buSzTx/>
+              <a:buFontTx/>
+              <a:buNone/>
+              <a:tabLst/>
+              <a:defRPr/>
+            </a:pPr>
+            <a:r>
+              <a:rPr lang="en-US" dirty="0" smtClean="0"/>
+              <a:t>Seed text generated from first 40 characters of oatmeal raisin cookie recipe.</a:t>
+            </a:r>
+            <a:endParaRPr lang="en-US" dirty="0"/>
+          </a:p>
+        </p:txBody>
+      </p:sp>
+      <p:sp>
+        <p:nvSpPr>
+          <p:cNvPr id="53" name="Content Placeholder 5"/>
+          <p:cNvSpPr>
+            <a:spLocks noGrp="1"/>
+          </p:cNvSpPr>
+          <p:nvPr>
+            <p:ph sz="quarter" idx="33"/>
+          </p:nvPr>
+        </p:nvSpPr>
+        <p:spPr>
+          <a:xfrm>
+            <a:off x="32003355" y="12369988"/>
+            <a:ext cx="4260380" cy="774027"/>
+          </a:xfrm>
+        </p:spPr>
+        <p:txBody>
+          <a:bodyPr>
+            <a:normAutofit/>
+          </a:bodyPr>
+          <a:lstStyle/>
+          <a:p>
+            <a:pPr marL="0" marR="0" lvl="0" indent="0" algn="ctr" defTabSz="914400" eaLnBrk="1" fontAlgn="auto" latinLnBrk="0" hangingPunct="1">
+              <a:lnSpc>
+                <a:spcPct val="100000"/>
+              </a:lnSpc>
+              <a:spcBef>
+                <a:spcPts val="0"/>
+              </a:spcBef>
+              <a:spcAft>
+                <a:spcPts val="0"/>
+              </a:spcAft>
+              <a:buClrTx/>
+              <a:buSzTx/>
+              <a:buFontTx/>
+              <a:buNone/>
+              <a:tabLst/>
+              <a:defRPr/>
+            </a:pPr>
+            <a:r>
+              <a:rPr lang="en-US" sz="2000" dirty="0" smtClean="0"/>
+              <a:t>Heat map with diversity = 0.2</a:t>
+            </a:r>
+            <a:endParaRPr lang="en-US" sz="2000" dirty="0"/>
+          </a:p>
+        </p:txBody>
+      </p:sp>
+      <p:sp>
+        <p:nvSpPr>
+          <p:cNvPr id="54" name="Content Placeholder 5"/>
+          <p:cNvSpPr>
+            <a:spLocks noGrp="1"/>
+          </p:cNvSpPr>
+          <p:nvPr>
+            <p:ph sz="quarter" idx="33"/>
+          </p:nvPr>
+        </p:nvSpPr>
+        <p:spPr>
+          <a:xfrm>
+            <a:off x="38180172" y="18018901"/>
+            <a:ext cx="4260380" cy="774027"/>
+          </a:xfrm>
+        </p:spPr>
+        <p:txBody>
+          <a:bodyPr>
+            <a:normAutofit/>
+          </a:bodyPr>
+          <a:lstStyle/>
+          <a:p>
+            <a:pPr marL="0" marR="0" lvl="0" indent="0" algn="ctr" defTabSz="914400" eaLnBrk="1" fontAlgn="auto" latinLnBrk="0" hangingPunct="1">
+              <a:lnSpc>
+                <a:spcPct val="100000"/>
+              </a:lnSpc>
+              <a:spcBef>
+                <a:spcPts val="0"/>
+              </a:spcBef>
+              <a:spcAft>
+                <a:spcPts val="0"/>
+              </a:spcAft>
+              <a:buClrTx/>
+              <a:buSzTx/>
+              <a:buFontTx/>
+              <a:buNone/>
+              <a:tabLst/>
+              <a:defRPr/>
+            </a:pPr>
+            <a:r>
+              <a:rPr lang="en-US" sz="2000" dirty="0" smtClean="0"/>
+              <a:t>Heat map with diversity = 1.2</a:t>
+            </a:r>
+            <a:endParaRPr lang="en-US" sz="2000" dirty="0"/>
+          </a:p>
+        </p:txBody>
+      </p:sp>
+      <p:pic>
+        <p:nvPicPr>
+          <p:cNvPr id="56" name="Content Placeholder 7"/>
+          <p:cNvPicPr>
+            <a:picLocks noGrp="1" noChangeAspect="1"/>
+          </p:cNvPicPr>
+          <p:nvPr>
+            <p:ph sz="quarter" idx="32"/>
+          </p:nvPr>
+        </p:nvPicPr>
+        <p:blipFill>
+          <a:blip r:embed="rId12">
+            <a:extLst>
+              <a:ext uri="{28A0092B-C50C-407E-A947-70E740481C1C}">
+                <a14:useLocalDpi xmlns:a14="http://schemas.microsoft.com/office/drawing/2010/main" val="0"/>
+              </a:ext>
+            </a:extLst>
+          </a:blip>
+          <a:stretch>
+            <a:fillRect/>
+          </a:stretch>
+        </p:blipFill>
+        <p:spPr>
+          <a:xfrm>
+            <a:off x="37409294" y="14082410"/>
+            <a:ext cx="6024416" cy="4141786"/>
+          </a:xfrm>
+        </p:spPr>
+      </p:pic>
+      <p:sp>
+        <p:nvSpPr>
+          <p:cNvPr id="57" name="Content Placeholder 5"/>
+          <p:cNvSpPr>
+            <a:spLocks noGrp="1"/>
+          </p:cNvSpPr>
+          <p:nvPr>
+            <p:ph sz="quarter" idx="33"/>
+          </p:nvPr>
+        </p:nvSpPr>
+        <p:spPr>
+          <a:xfrm>
+            <a:off x="32003355" y="18199271"/>
+            <a:ext cx="4260380" cy="774027"/>
+          </a:xfrm>
+        </p:spPr>
+        <p:txBody>
+          <a:bodyPr>
+            <a:normAutofit/>
+          </a:bodyPr>
+          <a:lstStyle/>
+          <a:p>
+            <a:pPr marL="0" marR="0" lvl="0" indent="0" algn="ctr" defTabSz="914400" eaLnBrk="1" fontAlgn="auto" latinLnBrk="0" hangingPunct="1">
+              <a:lnSpc>
+                <a:spcPct val="100000"/>
+              </a:lnSpc>
+              <a:spcBef>
+                <a:spcPts val="0"/>
+              </a:spcBef>
+              <a:spcAft>
+                <a:spcPts val="0"/>
+              </a:spcAft>
+              <a:buClrTx/>
+              <a:buSzTx/>
+              <a:buFontTx/>
+              <a:buNone/>
+              <a:tabLst/>
+              <a:defRPr/>
+            </a:pPr>
+            <a:r>
+              <a:rPr lang="en-US" sz="2000" dirty="0" smtClean="0"/>
+              <a:t>Heat map with diversity = 0.2</a:t>
+            </a:r>
+            <a:endParaRPr lang="en-US" sz="2000" dirty="0"/>
+          </a:p>
+        </p:txBody>
+      </p:sp>
+      <p:sp>
+        <p:nvSpPr>
+          <p:cNvPr id="59" name="Content Placeholder 5"/>
+          <p:cNvSpPr>
+            <a:spLocks noGrp="1"/>
+          </p:cNvSpPr>
+          <p:nvPr>
+            <p:ph sz="quarter" idx="33"/>
+          </p:nvPr>
+        </p:nvSpPr>
+        <p:spPr>
+          <a:xfrm>
+            <a:off x="38180172" y="12522387"/>
+            <a:ext cx="4260380" cy="774027"/>
+          </a:xfrm>
+        </p:spPr>
+        <p:txBody>
+          <a:bodyPr>
+            <a:normAutofit/>
+          </a:bodyPr>
+          <a:lstStyle/>
+          <a:p>
+            <a:pPr marL="0" marR="0" lvl="0" indent="0" algn="ctr" defTabSz="914400" eaLnBrk="1" fontAlgn="auto" latinLnBrk="0" hangingPunct="1">
+              <a:lnSpc>
+                <a:spcPct val="100000"/>
+              </a:lnSpc>
+              <a:spcBef>
+                <a:spcPts val="0"/>
+              </a:spcBef>
+              <a:spcAft>
+                <a:spcPts val="0"/>
+              </a:spcAft>
+              <a:buClrTx/>
+              <a:buSzTx/>
+              <a:buFontTx/>
+              <a:buNone/>
+              <a:tabLst/>
+              <a:defRPr/>
+            </a:pPr>
+            <a:r>
+              <a:rPr lang="en-US" sz="2000" dirty="0" smtClean="0"/>
+              <a:t>Heat map with diversity = 1.2</a:t>
+            </a:r>
+            <a:endParaRPr lang="en-US" sz="2000" dirty="0"/>
           </a:p>
         </p:txBody>
       </p:sp>

</xml_diff>